<commit_message>
Add Persistent Segment Tree, FINALLY * BEAUTIFUL!!!!
</commit_message>
<xml_diff>
--- a/Algorithms and Data Structures/String/String Matching (FFT)/String Matching.pptx
+++ b/Algorithms and Data Structures/String/String Matching (FFT)/String Matching.pptx
@@ -135,7 +135,7 @@
   <pc:docChgLst>
     <pc:chgData name="Nelson Gomes Neto" userId="3d991b98a67ad9fe" providerId="LiveId" clId="{7F61C235-9DC3-42AE-B943-1E9AFE2006A8}"/>
     <pc:docChg chg="undo redo custSel addSld delSld modSld sldOrd">
-      <pc:chgData name="Nelson Gomes Neto" userId="3d991b98a67ad9fe" providerId="LiveId" clId="{7F61C235-9DC3-42AE-B943-1E9AFE2006A8}" dt="2021-04-04T18:12:48.089" v="4227" actId="20577"/>
+      <pc:chgData name="Nelson Gomes Neto" userId="3d991b98a67ad9fe" providerId="LiveId" clId="{7F61C235-9DC3-42AE-B943-1E9AFE2006A8}" dt="2021-04-18T16:33:40.136" v="4484" actId="20577"/>
       <pc:docMkLst>
         <pc:docMk/>
       </pc:docMkLst>
@@ -163,7 +163,7 @@
         </pc:spChg>
       </pc:sldChg>
       <pc:sldChg chg="modSp new mod ord">
-        <pc:chgData name="Nelson Gomes Neto" userId="3d991b98a67ad9fe" providerId="LiveId" clId="{7F61C235-9DC3-42AE-B943-1E9AFE2006A8}" dt="2021-04-04T16:02:47.333" v="3946"/>
+        <pc:chgData name="Nelson Gomes Neto" userId="3d991b98a67ad9fe" providerId="LiveId" clId="{7F61C235-9DC3-42AE-B943-1E9AFE2006A8}" dt="2021-04-18T16:11:39.589" v="4420" actId="20577"/>
         <pc:sldMkLst>
           <pc:docMk/>
           <pc:sldMk cId="1444478292" sldId="257"/>
@@ -177,7 +177,7 @@
           </ac:spMkLst>
         </pc:spChg>
         <pc:spChg chg="mod">
-          <ac:chgData name="Nelson Gomes Neto" userId="3d991b98a67ad9fe" providerId="LiveId" clId="{7F61C235-9DC3-42AE-B943-1E9AFE2006A8}" dt="2021-04-04T15:59:47.110" v="3706" actId="20577"/>
+          <ac:chgData name="Nelson Gomes Neto" userId="3d991b98a67ad9fe" providerId="LiveId" clId="{7F61C235-9DC3-42AE-B943-1E9AFE2006A8}" dt="2021-04-18T16:11:39.589" v="4420" actId="20577"/>
           <ac:spMkLst>
             <pc:docMk/>
             <pc:sldMk cId="1444478292" sldId="257"/>
@@ -186,7 +186,7 @@
         </pc:spChg>
       </pc:sldChg>
       <pc:sldChg chg="modSp new mod">
-        <pc:chgData name="Nelson Gomes Neto" userId="3d991b98a67ad9fe" providerId="LiveId" clId="{7F61C235-9DC3-42AE-B943-1E9AFE2006A8}" dt="2021-04-04T17:56:52.954" v="4057" actId="27636"/>
+        <pc:chgData name="Nelson Gomes Neto" userId="3d991b98a67ad9fe" providerId="LiveId" clId="{7F61C235-9DC3-42AE-B943-1E9AFE2006A8}" dt="2021-04-18T16:08:19.615" v="4343" actId="20577"/>
         <pc:sldMkLst>
           <pc:docMk/>
           <pc:sldMk cId="3099457732" sldId="258"/>
@@ -200,7 +200,7 @@
           </ac:spMkLst>
         </pc:spChg>
         <pc:spChg chg="mod">
-          <ac:chgData name="Nelson Gomes Neto" userId="3d991b98a67ad9fe" providerId="LiveId" clId="{7F61C235-9DC3-42AE-B943-1E9AFE2006A8}" dt="2021-04-04T17:56:52.954" v="4057" actId="27636"/>
+          <ac:chgData name="Nelson Gomes Neto" userId="3d991b98a67ad9fe" providerId="LiveId" clId="{7F61C235-9DC3-42AE-B943-1E9AFE2006A8}" dt="2021-04-18T16:08:19.615" v="4343" actId="20577"/>
           <ac:spMkLst>
             <pc:docMk/>
             <pc:sldMk cId="3099457732" sldId="258"/>
@@ -308,13 +308,13 @@
         </pc:spChg>
       </pc:sldChg>
       <pc:sldChg chg="addSp delSp modSp add mod">
-        <pc:chgData name="Nelson Gomes Neto" userId="3d991b98a67ad9fe" providerId="LiveId" clId="{7F61C235-9DC3-42AE-B943-1E9AFE2006A8}" dt="2021-04-04T18:11:45.615" v="4185" actId="14100"/>
+        <pc:chgData name="Nelson Gomes Neto" userId="3d991b98a67ad9fe" providerId="LiveId" clId="{7F61C235-9DC3-42AE-B943-1E9AFE2006A8}" dt="2021-04-18T16:33:10.673" v="4464" actId="20577"/>
         <pc:sldMkLst>
           <pc:docMk/>
           <pc:sldMk cId="75941542" sldId="263"/>
         </pc:sldMkLst>
         <pc:spChg chg="mod">
-          <ac:chgData name="Nelson Gomes Neto" userId="3d991b98a67ad9fe" providerId="LiveId" clId="{7F61C235-9DC3-42AE-B943-1E9AFE2006A8}" dt="2021-04-04T18:10:46.176" v="4161" actId="27636"/>
+          <ac:chgData name="Nelson Gomes Neto" userId="3d991b98a67ad9fe" providerId="LiveId" clId="{7F61C235-9DC3-42AE-B943-1E9AFE2006A8}" dt="2021-04-18T16:20:53.836" v="4432" actId="20577"/>
           <ac:spMkLst>
             <pc:docMk/>
             <pc:sldMk cId="75941542" sldId="263"/>
@@ -346,7 +346,7 @@
           </ac:spMkLst>
         </pc:spChg>
         <pc:spChg chg="add mod">
-          <ac:chgData name="Nelson Gomes Neto" userId="3d991b98a67ad9fe" providerId="LiveId" clId="{7F61C235-9DC3-42AE-B943-1E9AFE2006A8}" dt="2021-04-04T18:11:45.615" v="4185" actId="14100"/>
+          <ac:chgData name="Nelson Gomes Neto" userId="3d991b98a67ad9fe" providerId="LiveId" clId="{7F61C235-9DC3-42AE-B943-1E9AFE2006A8}" dt="2021-04-18T16:33:10.673" v="4464" actId="20577"/>
           <ac:spMkLst>
             <pc:docMk/>
             <pc:sldMk cId="75941542" sldId="263"/>
@@ -355,13 +355,13 @@
         </pc:spChg>
       </pc:sldChg>
       <pc:sldChg chg="addSp modSp add mod">
-        <pc:chgData name="Nelson Gomes Neto" userId="3d991b98a67ad9fe" providerId="LiveId" clId="{7F61C235-9DC3-42AE-B943-1E9AFE2006A8}" dt="2021-04-04T18:12:19.839" v="4186" actId="1076"/>
+        <pc:chgData name="Nelson Gomes Neto" userId="3d991b98a67ad9fe" providerId="LiveId" clId="{7F61C235-9DC3-42AE-B943-1E9AFE2006A8}" dt="2021-04-18T16:33:04.451" v="4460" actId="20577"/>
         <pc:sldMkLst>
           <pc:docMk/>
           <pc:sldMk cId="1185541248" sldId="264"/>
         </pc:sldMkLst>
         <pc:spChg chg="mod">
-          <ac:chgData name="Nelson Gomes Neto" userId="3d991b98a67ad9fe" providerId="LiveId" clId="{7F61C235-9DC3-42AE-B943-1E9AFE2006A8}" dt="2021-04-04T18:12:19.839" v="4186" actId="1076"/>
+          <ac:chgData name="Nelson Gomes Neto" userId="3d991b98a67ad9fe" providerId="LiveId" clId="{7F61C235-9DC3-42AE-B943-1E9AFE2006A8}" dt="2021-04-18T16:33:04.451" v="4460" actId="20577"/>
           <ac:spMkLst>
             <pc:docMk/>
             <pc:sldMk cId="1185541248" sldId="264"/>
@@ -386,7 +386,7 @@
         </pc:spChg>
       </pc:sldChg>
       <pc:sldChg chg="addSp delSp modSp add mod">
-        <pc:chgData name="Nelson Gomes Neto" userId="3d991b98a67ad9fe" providerId="LiveId" clId="{7F61C235-9DC3-42AE-B943-1E9AFE2006A8}" dt="2021-04-04T01:31:49.974" v="3031" actId="20577"/>
+        <pc:chgData name="Nelson Gomes Neto" userId="3d991b98a67ad9fe" providerId="LiveId" clId="{7F61C235-9DC3-42AE-B943-1E9AFE2006A8}" dt="2021-04-18T16:33:40.136" v="4484" actId="20577"/>
         <pc:sldMkLst>
           <pc:docMk/>
           <pc:sldMk cId="282678872" sldId="265"/>
@@ -416,7 +416,7 @@
           </ac:spMkLst>
         </pc:spChg>
         <pc:spChg chg="add mod">
-          <ac:chgData name="Nelson Gomes Neto" userId="3d991b98a67ad9fe" providerId="LiveId" clId="{7F61C235-9DC3-42AE-B943-1E9AFE2006A8}" dt="2021-04-04T01:31:49.974" v="3031" actId="20577"/>
+          <ac:chgData name="Nelson Gomes Neto" userId="3d991b98a67ad9fe" providerId="LiveId" clId="{7F61C235-9DC3-42AE-B943-1E9AFE2006A8}" dt="2021-04-18T16:33:40.136" v="4484" actId="20577"/>
           <ac:spMkLst>
             <pc:docMk/>
             <pc:sldMk cId="282678872" sldId="265"/>
@@ -433,13 +433,21 @@
         </pc:spChg>
       </pc:sldChg>
       <pc:sldChg chg="addSp delSp modSp add mod">
-        <pc:chgData name="Nelson Gomes Neto" userId="3d991b98a67ad9fe" providerId="LiveId" clId="{7F61C235-9DC3-42AE-B943-1E9AFE2006A8}" dt="2021-04-04T16:40:21.055" v="4046" actId="1076"/>
+        <pc:chgData name="Nelson Gomes Neto" userId="3d991b98a67ad9fe" providerId="LiveId" clId="{7F61C235-9DC3-42AE-B943-1E9AFE2006A8}" dt="2021-04-18T16:33:32.589" v="4480" actId="20577"/>
         <pc:sldMkLst>
           <pc:docMk/>
           <pc:sldMk cId="1804970600" sldId="266"/>
         </pc:sldMkLst>
         <pc:spChg chg="mod">
-          <ac:chgData name="Nelson Gomes Neto" userId="3d991b98a67ad9fe" providerId="LiveId" clId="{7F61C235-9DC3-42AE-B943-1E9AFE2006A8}" dt="2021-04-04T16:40:21.055" v="4046" actId="1076"/>
+          <ac:chgData name="Nelson Gomes Neto" userId="3d991b98a67ad9fe" providerId="LiveId" clId="{7F61C235-9DC3-42AE-B943-1E9AFE2006A8}" dt="2021-04-18T16:33:00.728" v="4456" actId="20577"/>
+          <ac:spMkLst>
+            <pc:docMk/>
+            <pc:sldMk cId="1804970600" sldId="266"/>
+            <ac:spMk id="3" creationId="{DA8ED598-D09B-4BF5-8B6D-44B9D5266DFC}"/>
+          </ac:spMkLst>
+        </pc:spChg>
+        <pc:spChg chg="mod">
+          <ac:chgData name="Nelson Gomes Neto" userId="3d991b98a67ad9fe" providerId="LiveId" clId="{7F61C235-9DC3-42AE-B943-1E9AFE2006A8}" dt="2021-04-18T16:33:32.589" v="4480" actId="20577"/>
           <ac:spMkLst>
             <pc:docMk/>
             <pc:sldMk cId="1804970600" sldId="266"/>
@@ -464,7 +472,7 @@
         </pc:spChg>
       </pc:sldChg>
       <pc:sldChg chg="modSp add mod">
-        <pc:chgData name="Nelson Gomes Neto" userId="3d991b98a67ad9fe" providerId="LiveId" clId="{7F61C235-9DC3-42AE-B943-1E9AFE2006A8}" dt="2021-04-04T01:32:31.039" v="3060" actId="20577"/>
+        <pc:chgData name="Nelson Gomes Neto" userId="3d991b98a67ad9fe" providerId="LiveId" clId="{7F61C235-9DC3-42AE-B943-1E9AFE2006A8}" dt="2021-04-18T16:04:46.056" v="4316" actId="114"/>
         <pc:sldMkLst>
           <pc:docMk/>
           <pc:sldMk cId="2070959648" sldId="267"/>
@@ -478,7 +486,7 @@
           </ac:spMkLst>
         </pc:spChg>
         <pc:spChg chg="mod">
-          <ac:chgData name="Nelson Gomes Neto" userId="3d991b98a67ad9fe" providerId="LiveId" clId="{7F61C235-9DC3-42AE-B943-1E9AFE2006A8}" dt="2021-04-04T01:32:31.039" v="3060" actId="20577"/>
+          <ac:chgData name="Nelson Gomes Neto" userId="3d991b98a67ad9fe" providerId="LiveId" clId="{7F61C235-9DC3-42AE-B943-1E9AFE2006A8}" dt="2021-04-18T16:04:46.056" v="4316" actId="114"/>
           <ac:spMkLst>
             <pc:docMk/>
             <pc:sldMk cId="2070959648" sldId="267"/>
@@ -524,13 +532,13 @@
         </pc:sldMkLst>
       </pc:sldChg>
       <pc:sldChg chg="modSp add mod ord">
-        <pc:chgData name="Nelson Gomes Neto" userId="3d991b98a67ad9fe" providerId="LiveId" clId="{7F61C235-9DC3-42AE-B943-1E9AFE2006A8}" dt="2021-04-04T01:41:37.430" v="3658" actId="20577"/>
+        <pc:chgData name="Nelson Gomes Neto" userId="3d991b98a67ad9fe" providerId="LiveId" clId="{7F61C235-9DC3-42AE-B943-1E9AFE2006A8}" dt="2021-04-18T16:32:44.871" v="4452" actId="20577"/>
         <pc:sldMkLst>
           <pc:docMk/>
           <pc:sldMk cId="51747817" sldId="270"/>
         </pc:sldMkLst>
         <pc:spChg chg="mod">
-          <ac:chgData name="Nelson Gomes Neto" userId="3d991b98a67ad9fe" providerId="LiveId" clId="{7F61C235-9DC3-42AE-B943-1E9AFE2006A8}" dt="2021-04-04T01:41:37.430" v="3658" actId="20577"/>
+          <ac:chgData name="Nelson Gomes Neto" userId="3d991b98a67ad9fe" providerId="LiveId" clId="{7F61C235-9DC3-42AE-B943-1E9AFE2006A8}" dt="2021-04-18T16:32:44.871" v="4452" actId="20577"/>
           <ac:spMkLst>
             <pc:docMk/>
             <pc:sldMk cId="51747817" sldId="270"/>
@@ -692,7 +700,7 @@
           <a:noFill/>
           <a:extLst>
             <a:ext uri="{909E8E84-426E-40dd-AFC4-6F175D3DCCD1}">
-              <a14:hiddenFill xmlns="" xmlns:a14="http://schemas.microsoft.com/office/drawing/2010/main">
+              <a14:hiddenFill xmlns:a14="http://schemas.microsoft.com/office/drawing/2010/main" xmlns="">
                 <a:solidFill>
                   <a:srgbClr val="FFFFFF"/>
                 </a:solidFill>
@@ -752,7 +760,7 @@
             </a:ln>
             <a:extLst>
               <a:ext uri="{91240B29-F687-4f45-9708-019B960494DF}">
-                <a14:hiddenLine xmlns="" xmlns:a14="http://schemas.microsoft.com/office/drawing/2010/main" w="9525">
+                <a14:hiddenLine xmlns:a14="http://schemas.microsoft.com/office/drawing/2010/main" xmlns="" w="9525">
                   <a:solidFill>
                     <a:srgbClr val="000000"/>
                   </a:solidFill>
@@ -842,7 +850,7 @@
             </a:ln>
             <a:extLst>
               <a:ext uri="{91240B29-F687-4f45-9708-019B960494DF}">
-                <a14:hiddenLine xmlns="" xmlns:a14="http://schemas.microsoft.com/office/drawing/2010/main" w="9525">
+                <a14:hiddenLine xmlns:a14="http://schemas.microsoft.com/office/drawing/2010/main" xmlns="" w="9525">
                   <a:solidFill>
                     <a:srgbClr val="000000"/>
                   </a:solidFill>
@@ -932,7 +940,7 @@
             </a:ln>
             <a:extLst>
               <a:ext uri="{91240B29-F687-4f45-9708-019B960494DF}">
-                <a14:hiddenLine xmlns="" xmlns:a14="http://schemas.microsoft.com/office/drawing/2010/main" w="9525">
+                <a14:hiddenLine xmlns:a14="http://schemas.microsoft.com/office/drawing/2010/main" xmlns="" w="9525">
                   <a:solidFill>
                     <a:srgbClr val="000000"/>
                   </a:solidFill>
@@ -966,7 +974,7 @@
             </a:ln>
             <a:extLst>
               <a:ext uri="{91240B29-F687-4f45-9708-019B960494DF}">
-                <a14:hiddenLine xmlns="" xmlns:a14="http://schemas.microsoft.com/office/drawing/2010/main" w="9525">
+                <a14:hiddenLine xmlns:a14="http://schemas.microsoft.com/office/drawing/2010/main" xmlns="" w="9525">
                   <a:solidFill>
                     <a:srgbClr val="000000"/>
                   </a:solidFill>
@@ -1056,7 +1064,7 @@
             </a:ln>
             <a:extLst>
               <a:ext uri="{91240B29-F687-4f45-9708-019B960494DF}">
-                <a14:hiddenLine xmlns="" xmlns:a14="http://schemas.microsoft.com/office/drawing/2010/main" w="9525">
+                <a14:hiddenLine xmlns:a14="http://schemas.microsoft.com/office/drawing/2010/main" xmlns="" w="9525">
                   <a:solidFill>
                     <a:srgbClr val="000000"/>
                   </a:solidFill>
@@ -1118,7 +1126,7 @@
             </a:ln>
             <a:extLst>
               <a:ext uri="{91240B29-F687-4f45-9708-019B960494DF}">
-                <a14:hiddenLine xmlns="" xmlns:a14="http://schemas.microsoft.com/office/drawing/2010/main" w="9525">
+                <a14:hiddenLine xmlns:a14="http://schemas.microsoft.com/office/drawing/2010/main" xmlns="" w="9525">
                   <a:solidFill>
                     <a:srgbClr val="000000"/>
                   </a:solidFill>
@@ -1180,7 +1188,7 @@
             </a:ln>
             <a:extLst>
               <a:ext uri="{91240B29-F687-4f45-9708-019B960494DF}">
-                <a14:hiddenLine xmlns="" xmlns:a14="http://schemas.microsoft.com/office/drawing/2010/main" w="9525">
+                <a14:hiddenLine xmlns:a14="http://schemas.microsoft.com/office/drawing/2010/main" xmlns="" w="9525">
                   <a:solidFill>
                     <a:srgbClr val="000000"/>
                   </a:solidFill>
@@ -1270,7 +1278,7 @@
             </a:ln>
             <a:extLst>
               <a:ext uri="{91240B29-F687-4f45-9708-019B960494DF}">
-                <a14:hiddenLine xmlns="" xmlns:a14="http://schemas.microsoft.com/office/drawing/2010/main" w="9525">
+                <a14:hiddenLine xmlns:a14="http://schemas.microsoft.com/office/drawing/2010/main" xmlns="" w="9525">
                   <a:solidFill>
                     <a:srgbClr val="000000"/>
                   </a:solidFill>
@@ -1332,7 +1340,7 @@
             </a:ln>
             <a:extLst>
               <a:ext uri="{91240B29-F687-4f45-9708-019B960494DF}">
-                <a14:hiddenLine xmlns="" xmlns:a14="http://schemas.microsoft.com/office/drawing/2010/main" w="9525">
+                <a14:hiddenLine xmlns:a14="http://schemas.microsoft.com/office/drawing/2010/main" xmlns="" w="9525">
                   <a:solidFill>
                     <a:srgbClr val="000000"/>
                   </a:solidFill>
@@ -1394,7 +1402,7 @@
             </a:ln>
             <a:extLst>
               <a:ext uri="{91240B29-F687-4f45-9708-019B960494DF}">
-                <a14:hiddenLine xmlns="" xmlns:a14="http://schemas.microsoft.com/office/drawing/2010/main" w="9525">
+                <a14:hiddenLine xmlns:a14="http://schemas.microsoft.com/office/drawing/2010/main" xmlns="" w="9525">
                   <a:solidFill>
                     <a:srgbClr val="000000"/>
                   </a:solidFill>
@@ -1484,7 +1492,7 @@
             </a:ln>
             <a:extLst>
               <a:ext uri="{91240B29-F687-4f45-9708-019B960494DF}">
-                <a14:hiddenLine xmlns="" xmlns:a14="http://schemas.microsoft.com/office/drawing/2010/main" w="9525">
+                <a14:hiddenLine xmlns:a14="http://schemas.microsoft.com/office/drawing/2010/main" xmlns="" w="9525">
                   <a:solidFill>
                     <a:srgbClr val="000000"/>
                   </a:solidFill>
@@ -1574,7 +1582,7 @@
             </a:ln>
             <a:extLst>
               <a:ext uri="{91240B29-F687-4f45-9708-019B960494DF}">
-                <a14:hiddenLine xmlns="" xmlns:a14="http://schemas.microsoft.com/office/drawing/2010/main" w="9525">
+                <a14:hiddenLine xmlns:a14="http://schemas.microsoft.com/office/drawing/2010/main" xmlns="" w="9525">
                   <a:solidFill>
                     <a:srgbClr val="000000"/>
                   </a:solidFill>
@@ -1636,7 +1644,7 @@
             </a:ln>
             <a:extLst>
               <a:ext uri="{91240B29-F687-4f45-9708-019B960494DF}">
-                <a14:hiddenLine xmlns="" xmlns:a14="http://schemas.microsoft.com/office/drawing/2010/main" w="9525">
+                <a14:hiddenLine xmlns:a14="http://schemas.microsoft.com/office/drawing/2010/main" xmlns="" w="9525">
                   <a:solidFill>
                     <a:srgbClr val="000000"/>
                   </a:solidFill>
@@ -1746,7 +1754,7 @@
             </a:ln>
             <a:extLst>
               <a:ext uri="{91240B29-F687-4f45-9708-019B960494DF}">
-                <a14:hiddenLine xmlns="" xmlns:a14="http://schemas.microsoft.com/office/drawing/2010/main" w="9525">
+                <a14:hiddenLine xmlns:a14="http://schemas.microsoft.com/office/drawing/2010/main" xmlns="" w="9525">
                   <a:solidFill>
                     <a:srgbClr val="000000"/>
                   </a:solidFill>
@@ -1808,7 +1816,7 @@
             </a:ln>
             <a:extLst>
               <a:ext uri="{91240B29-F687-4f45-9708-019B960494DF}">
-                <a14:hiddenLine xmlns="" xmlns:a14="http://schemas.microsoft.com/office/drawing/2010/main" w="9525">
+                <a14:hiddenLine xmlns:a14="http://schemas.microsoft.com/office/drawing/2010/main" xmlns="" w="9525">
                   <a:solidFill>
                     <a:srgbClr val="000000"/>
                   </a:solidFill>
@@ -1898,7 +1906,7 @@
             </a:ln>
             <a:extLst>
               <a:ext uri="{91240B29-F687-4f45-9708-019B960494DF}">
-                <a14:hiddenLine xmlns="" xmlns:a14="http://schemas.microsoft.com/office/drawing/2010/main" w="9525">
+                <a14:hiddenLine xmlns:a14="http://schemas.microsoft.com/office/drawing/2010/main" xmlns="" w="9525">
                   <a:solidFill>
                     <a:srgbClr val="000000"/>
                   </a:solidFill>
@@ -1988,7 +1996,7 @@
             </a:ln>
             <a:extLst>
               <a:ext uri="{91240B29-F687-4f45-9708-019B960494DF}">
-                <a14:hiddenLine xmlns="" xmlns:a14="http://schemas.microsoft.com/office/drawing/2010/main" w="9525">
+                <a14:hiddenLine xmlns:a14="http://schemas.microsoft.com/office/drawing/2010/main" xmlns="" w="9525">
                   <a:solidFill>
                     <a:srgbClr val="000000"/>
                   </a:solidFill>
@@ -2050,7 +2058,7 @@
             </a:ln>
             <a:extLst>
               <a:ext uri="{91240B29-F687-4f45-9708-019B960494DF}">
-                <a14:hiddenLine xmlns="" xmlns:a14="http://schemas.microsoft.com/office/drawing/2010/main" w="9525">
+                <a14:hiddenLine xmlns:a14="http://schemas.microsoft.com/office/drawing/2010/main" xmlns="" w="9525">
                   <a:solidFill>
                     <a:srgbClr val="000000"/>
                   </a:solidFill>
@@ -2140,7 +2148,7 @@
             </a:ln>
             <a:extLst>
               <a:ext uri="{91240B29-F687-4f45-9708-019B960494DF}">
-                <a14:hiddenLine xmlns="" xmlns:a14="http://schemas.microsoft.com/office/drawing/2010/main" w="9525">
+                <a14:hiddenLine xmlns:a14="http://schemas.microsoft.com/office/drawing/2010/main" xmlns="" w="9525">
                   <a:solidFill>
                     <a:srgbClr val="000000"/>
                   </a:solidFill>
@@ -2230,7 +2238,7 @@
             </a:ln>
             <a:extLst>
               <a:ext uri="{91240B29-F687-4f45-9708-019B960494DF}">
-                <a14:hiddenLine xmlns="" xmlns:a14="http://schemas.microsoft.com/office/drawing/2010/main" w="9525">
+                <a14:hiddenLine xmlns:a14="http://schemas.microsoft.com/office/drawing/2010/main" xmlns="" w="9525">
                   <a:solidFill>
                     <a:srgbClr val="000000"/>
                   </a:solidFill>
@@ -2286,7 +2294,7 @@
             </a:ln>
             <a:extLst>
               <a:ext uri="{91240B29-F687-4f45-9708-019B960494DF}">
-                <a14:hiddenLine xmlns="" xmlns:a14="http://schemas.microsoft.com/office/drawing/2010/main" w="9525">
+                <a14:hiddenLine xmlns:a14="http://schemas.microsoft.com/office/drawing/2010/main" xmlns="" w="9525">
                   <a:solidFill>
                     <a:srgbClr val="000000"/>
                   </a:solidFill>
@@ -2376,7 +2384,7 @@
             </a:ln>
             <a:extLst>
               <a:ext uri="{91240B29-F687-4f45-9708-019B960494DF}">
-                <a14:hiddenLine xmlns="" xmlns:a14="http://schemas.microsoft.com/office/drawing/2010/main" w="9525">
+                <a14:hiddenLine xmlns:a14="http://schemas.microsoft.com/office/drawing/2010/main" xmlns="" w="9525">
                   <a:solidFill>
                     <a:srgbClr val="000000"/>
                   </a:solidFill>
@@ -2432,7 +2440,7 @@
             </a:ln>
             <a:extLst>
               <a:ext uri="{91240B29-F687-4f45-9708-019B960494DF}">
-                <a14:hiddenLine xmlns="" xmlns:a14="http://schemas.microsoft.com/office/drawing/2010/main" w="9525">
+                <a14:hiddenLine xmlns:a14="http://schemas.microsoft.com/office/drawing/2010/main" xmlns="" w="9525">
                   <a:solidFill>
                     <a:srgbClr val="000000"/>
                   </a:solidFill>
@@ -2522,7 +2530,7 @@
             </a:ln>
             <a:extLst>
               <a:ext uri="{91240B29-F687-4f45-9708-019B960494DF}">
-                <a14:hiddenLine xmlns="" xmlns:a14="http://schemas.microsoft.com/office/drawing/2010/main" w="9525">
+                <a14:hiddenLine xmlns:a14="http://schemas.microsoft.com/office/drawing/2010/main" xmlns="" w="9525">
                   <a:solidFill>
                     <a:srgbClr val="000000"/>
                   </a:solidFill>
@@ -2590,7 +2598,7 @@
             </a:ln>
             <a:extLst>
               <a:ext uri="{91240B29-F687-4f45-9708-019B960494DF}">
-                <a14:hiddenLine xmlns="" xmlns:a14="http://schemas.microsoft.com/office/drawing/2010/main" w="9525">
+                <a14:hiddenLine xmlns:a14="http://schemas.microsoft.com/office/drawing/2010/main" xmlns="" w="9525">
                   <a:solidFill>
                     <a:srgbClr val="000000"/>
                   </a:solidFill>
@@ -2680,7 +2688,7 @@
             </a:ln>
             <a:extLst>
               <a:ext uri="{91240B29-F687-4f45-9708-019B960494DF}">
-                <a14:hiddenLine xmlns="" xmlns:a14="http://schemas.microsoft.com/office/drawing/2010/main" w="9525">
+                <a14:hiddenLine xmlns:a14="http://schemas.microsoft.com/office/drawing/2010/main" xmlns="" w="9525">
                   <a:solidFill>
                     <a:srgbClr val="000000"/>
                   </a:solidFill>
@@ -2748,7 +2756,7 @@
             </a:ln>
             <a:extLst>
               <a:ext uri="{91240B29-F687-4f45-9708-019B960494DF}">
-                <a14:hiddenLine xmlns="" xmlns:a14="http://schemas.microsoft.com/office/drawing/2010/main" w="9525">
+                <a14:hiddenLine xmlns:a14="http://schemas.microsoft.com/office/drawing/2010/main" xmlns="" w="9525">
                   <a:solidFill>
                     <a:srgbClr val="000000"/>
                   </a:solidFill>
@@ -2838,7 +2846,7 @@
             </a:ln>
             <a:extLst>
               <a:ext uri="{91240B29-F687-4f45-9708-019B960494DF}">
-                <a14:hiddenLine xmlns="" xmlns:a14="http://schemas.microsoft.com/office/drawing/2010/main" w="9525">
+                <a14:hiddenLine xmlns:a14="http://schemas.microsoft.com/office/drawing/2010/main" xmlns="" w="9525">
                   <a:solidFill>
                     <a:srgbClr val="000000"/>
                   </a:solidFill>
@@ -2872,7 +2880,7 @@
             </a:ln>
             <a:extLst>
               <a:ext uri="{91240B29-F687-4f45-9708-019B960494DF}">
-                <a14:hiddenLine xmlns="" xmlns:a14="http://schemas.microsoft.com/office/drawing/2010/main" w="9525">
+                <a14:hiddenLine xmlns:a14="http://schemas.microsoft.com/office/drawing/2010/main" xmlns="" w="9525">
                   <a:solidFill>
                     <a:srgbClr val="000000"/>
                   </a:solidFill>
@@ -2962,7 +2970,7 @@
             </a:ln>
             <a:extLst>
               <a:ext uri="{91240B29-F687-4f45-9708-019B960494DF}">
-                <a14:hiddenLine xmlns="" xmlns:a14="http://schemas.microsoft.com/office/drawing/2010/main" w="9525">
+                <a14:hiddenLine xmlns:a14="http://schemas.microsoft.com/office/drawing/2010/main" xmlns="" w="9525">
                   <a:solidFill>
                     <a:srgbClr val="000000"/>
                   </a:solidFill>
@@ -3024,7 +3032,7 @@
             </a:ln>
             <a:extLst>
               <a:ext uri="{91240B29-F687-4f45-9708-019B960494DF}">
-                <a14:hiddenLine xmlns="" xmlns:a14="http://schemas.microsoft.com/office/drawing/2010/main" w="9525">
+                <a14:hiddenLine xmlns:a14="http://schemas.microsoft.com/office/drawing/2010/main" xmlns="" w="9525">
                   <a:solidFill>
                     <a:srgbClr val="000000"/>
                   </a:solidFill>
@@ -3086,7 +3094,7 @@
             </a:ln>
             <a:extLst>
               <a:ext uri="{91240B29-F687-4f45-9708-019B960494DF}">
-                <a14:hiddenLine xmlns="" xmlns:a14="http://schemas.microsoft.com/office/drawing/2010/main" w="9525">
+                <a14:hiddenLine xmlns:a14="http://schemas.microsoft.com/office/drawing/2010/main" xmlns="" w="9525">
                   <a:solidFill>
                     <a:srgbClr val="000000"/>
                   </a:solidFill>
@@ -3176,7 +3184,7 @@
             </a:ln>
             <a:extLst>
               <a:ext uri="{91240B29-F687-4f45-9708-019B960494DF}">
-                <a14:hiddenLine xmlns="" xmlns:a14="http://schemas.microsoft.com/office/drawing/2010/main" w="9525">
+                <a14:hiddenLine xmlns:a14="http://schemas.microsoft.com/office/drawing/2010/main" xmlns="" w="9525">
                   <a:solidFill>
                     <a:srgbClr val="000000"/>
                   </a:solidFill>
@@ -3244,7 +3252,7 @@
             </a:ln>
             <a:extLst>
               <a:ext uri="{91240B29-F687-4f45-9708-019B960494DF}">
-                <a14:hiddenLine xmlns="" xmlns:a14="http://schemas.microsoft.com/office/drawing/2010/main" w="9525">
+                <a14:hiddenLine xmlns:a14="http://schemas.microsoft.com/office/drawing/2010/main" xmlns="" w="9525">
                   <a:solidFill>
                     <a:srgbClr val="000000"/>
                   </a:solidFill>
@@ -3306,7 +3314,7 @@
             </a:ln>
             <a:extLst>
               <a:ext uri="{91240B29-F687-4f45-9708-019B960494DF}">
-                <a14:hiddenLine xmlns="" xmlns:a14="http://schemas.microsoft.com/office/drawing/2010/main" w="9525">
+                <a14:hiddenLine xmlns:a14="http://schemas.microsoft.com/office/drawing/2010/main" xmlns="" w="9525">
                   <a:solidFill>
                     <a:srgbClr val="000000"/>
                   </a:solidFill>
@@ -3396,7 +3404,7 @@
             </a:ln>
             <a:extLst>
               <a:ext uri="{91240B29-F687-4f45-9708-019B960494DF}">
-                <a14:hiddenLine xmlns="" xmlns:a14="http://schemas.microsoft.com/office/drawing/2010/main" w="9525">
+                <a14:hiddenLine xmlns:a14="http://schemas.microsoft.com/office/drawing/2010/main" xmlns="" w="9525">
                   <a:solidFill>
                     <a:srgbClr val="000000"/>
                   </a:solidFill>
@@ -3458,7 +3466,7 @@
             </a:ln>
             <a:extLst>
               <a:ext uri="{91240B29-F687-4f45-9708-019B960494DF}">
-                <a14:hiddenLine xmlns="" xmlns:a14="http://schemas.microsoft.com/office/drawing/2010/main" w="9525">
+                <a14:hiddenLine xmlns:a14="http://schemas.microsoft.com/office/drawing/2010/main" xmlns="" w="9525">
                   <a:solidFill>
                     <a:srgbClr val="000000"/>
                   </a:solidFill>
@@ -3548,7 +3556,7 @@
             </a:ln>
             <a:extLst>
               <a:ext uri="{91240B29-F687-4f45-9708-019B960494DF}">
-                <a14:hiddenLine xmlns="" xmlns:a14="http://schemas.microsoft.com/office/drawing/2010/main" w="9525">
+                <a14:hiddenLine xmlns:a14="http://schemas.microsoft.com/office/drawing/2010/main" xmlns="" w="9525">
                   <a:solidFill>
                     <a:srgbClr val="000000"/>
                   </a:solidFill>
@@ -3610,7 +3618,7 @@
             </a:ln>
             <a:extLst>
               <a:ext uri="{91240B29-F687-4f45-9708-019B960494DF}">
-                <a14:hiddenLine xmlns="" xmlns:a14="http://schemas.microsoft.com/office/drawing/2010/main" w="9525">
+                <a14:hiddenLine xmlns:a14="http://schemas.microsoft.com/office/drawing/2010/main" xmlns="" w="9525">
                   <a:solidFill>
                     <a:srgbClr val="000000"/>
                   </a:solidFill>
@@ -3700,7 +3708,7 @@
             </a:ln>
             <a:extLst>
               <a:ext uri="{91240B29-F687-4f45-9708-019B960494DF}">
-                <a14:hiddenLine xmlns="" xmlns:a14="http://schemas.microsoft.com/office/drawing/2010/main" w="9525">
+                <a14:hiddenLine xmlns:a14="http://schemas.microsoft.com/office/drawing/2010/main" xmlns="" w="9525">
                   <a:solidFill>
                     <a:srgbClr val="000000"/>
                   </a:solidFill>
@@ -3734,7 +3742,7 @@
             </a:ln>
             <a:extLst>
               <a:ext uri="{91240B29-F687-4f45-9708-019B960494DF}">
-                <a14:hiddenLine xmlns="" xmlns:a14="http://schemas.microsoft.com/office/drawing/2010/main" w="9525">
+                <a14:hiddenLine xmlns:a14="http://schemas.microsoft.com/office/drawing/2010/main" xmlns="" w="9525">
                   <a:solidFill>
                     <a:srgbClr val="000000"/>
                   </a:solidFill>
@@ -3799,7 +3807,7 @@
             </a:ln>
             <a:extLst>
               <a:ext uri="{91240B29-F687-4f45-9708-019B960494DF}">
-                <a14:hiddenLine xmlns="" xmlns:a14="http://schemas.microsoft.com/office/drawing/2010/main" w="9525">
+                <a14:hiddenLine xmlns:a14="http://schemas.microsoft.com/office/drawing/2010/main" xmlns="" w="9525">
                   <a:solidFill>
                     <a:srgbClr val="000000"/>
                   </a:solidFill>
@@ -3889,7 +3897,7 @@
             </a:ln>
             <a:extLst>
               <a:ext uri="{91240B29-F687-4f45-9708-019B960494DF}">
-                <a14:hiddenLine xmlns="" xmlns:a14="http://schemas.microsoft.com/office/drawing/2010/main" w="9525">
+                <a14:hiddenLine xmlns:a14="http://schemas.microsoft.com/office/drawing/2010/main" xmlns="" w="9525">
                   <a:solidFill>
                     <a:srgbClr val="000000"/>
                   </a:solidFill>
@@ -3951,7 +3959,7 @@
             </a:ln>
             <a:extLst>
               <a:ext uri="{91240B29-F687-4f45-9708-019B960494DF}">
-                <a14:hiddenLine xmlns="" xmlns:a14="http://schemas.microsoft.com/office/drawing/2010/main" w="9525">
+                <a14:hiddenLine xmlns:a14="http://schemas.microsoft.com/office/drawing/2010/main" xmlns="" w="9525">
                   <a:solidFill>
                     <a:srgbClr val="000000"/>
                   </a:solidFill>
@@ -4041,7 +4049,7 @@
             </a:ln>
             <a:extLst>
               <a:ext uri="{91240B29-F687-4f45-9708-019B960494DF}">
-                <a14:hiddenLine xmlns="" xmlns:a14="http://schemas.microsoft.com/office/drawing/2010/main" w="9525">
+                <a14:hiddenLine xmlns:a14="http://schemas.microsoft.com/office/drawing/2010/main" xmlns="" w="9525">
                   <a:solidFill>
                     <a:srgbClr val="000000"/>
                   </a:solidFill>
@@ -4131,7 +4139,7 @@
             </a:ln>
             <a:extLst>
               <a:ext uri="{91240B29-F687-4f45-9708-019B960494DF}">
-                <a14:hiddenLine xmlns="" xmlns:a14="http://schemas.microsoft.com/office/drawing/2010/main" w="9525">
+                <a14:hiddenLine xmlns:a14="http://schemas.microsoft.com/office/drawing/2010/main" xmlns="" w="9525">
                   <a:solidFill>
                     <a:srgbClr val="000000"/>
                   </a:solidFill>
@@ -4196,7 +4204,7 @@
             </a:ln>
             <a:extLst>
               <a:ext uri="{91240B29-F687-4f45-9708-019B960494DF}">
-                <a14:hiddenLine xmlns="" xmlns:a14="http://schemas.microsoft.com/office/drawing/2010/main" w="9525">
+                <a14:hiddenLine xmlns:a14="http://schemas.microsoft.com/office/drawing/2010/main" xmlns="" w="9525">
                   <a:solidFill>
                     <a:srgbClr val="000000"/>
                   </a:solidFill>
@@ -4258,7 +4266,7 @@
             </a:ln>
             <a:extLst>
               <a:ext uri="{91240B29-F687-4f45-9708-019B960494DF}">
-                <a14:hiddenLine xmlns="" xmlns:a14="http://schemas.microsoft.com/office/drawing/2010/main" w="9525">
+                <a14:hiddenLine xmlns:a14="http://schemas.microsoft.com/office/drawing/2010/main" xmlns="" w="9525">
                   <a:solidFill>
                     <a:srgbClr val="000000"/>
                   </a:solidFill>
@@ -4348,7 +4356,7 @@
             </a:ln>
             <a:extLst>
               <a:ext uri="{91240B29-F687-4f45-9708-019B960494DF}">
-                <a14:hiddenLine xmlns="" xmlns:a14="http://schemas.microsoft.com/office/drawing/2010/main" w="9525">
+                <a14:hiddenLine xmlns:a14="http://schemas.microsoft.com/office/drawing/2010/main" xmlns="" w="9525">
                   <a:solidFill>
                     <a:srgbClr val="000000"/>
                   </a:solidFill>
@@ -4438,7 +4446,7 @@
             </a:ln>
             <a:extLst>
               <a:ext uri="{91240B29-F687-4f45-9708-019B960494DF}">
-                <a14:hiddenLine xmlns="" xmlns:a14="http://schemas.microsoft.com/office/drawing/2010/main" w="9525">
+                <a14:hiddenLine xmlns:a14="http://schemas.microsoft.com/office/drawing/2010/main" xmlns="" w="9525">
                   <a:solidFill>
                     <a:srgbClr val="000000"/>
                   </a:solidFill>
@@ -4500,7 +4508,7 @@
             </a:ln>
             <a:extLst>
               <a:ext uri="{91240B29-F687-4f45-9708-019B960494DF}">
-                <a14:hiddenLine xmlns="" xmlns:a14="http://schemas.microsoft.com/office/drawing/2010/main" w="9525">
+                <a14:hiddenLine xmlns:a14="http://schemas.microsoft.com/office/drawing/2010/main" xmlns="" w="9525">
                   <a:solidFill>
                     <a:srgbClr val="000000"/>
                   </a:solidFill>
@@ -4620,7 +4628,7 @@
             </a:ln>
             <a:extLst>
               <a:ext uri="{91240B29-F687-4f45-9708-019B960494DF}">
-                <a14:hiddenLine xmlns="" xmlns:a14="http://schemas.microsoft.com/office/drawing/2010/main" w="9525">
+                <a14:hiddenLine xmlns:a14="http://schemas.microsoft.com/office/drawing/2010/main" xmlns="" w="9525">
                   <a:solidFill>
                     <a:srgbClr val="000000"/>
                   </a:solidFill>
@@ -4688,7 +4696,7 @@
             </a:ln>
             <a:extLst>
               <a:ext uri="{91240B29-F687-4f45-9708-019B960494DF}">
-                <a14:hiddenLine xmlns="" xmlns:a14="http://schemas.microsoft.com/office/drawing/2010/main" w="9525">
+                <a14:hiddenLine xmlns:a14="http://schemas.microsoft.com/office/drawing/2010/main" xmlns="" w="9525">
                   <a:solidFill>
                     <a:srgbClr val="000000"/>
                   </a:solidFill>
@@ -4778,7 +4786,7 @@
             </a:ln>
             <a:extLst>
               <a:ext uri="{91240B29-F687-4f45-9708-019B960494DF}">
-                <a14:hiddenLine xmlns="" xmlns:a14="http://schemas.microsoft.com/office/drawing/2010/main" w="9525">
+                <a14:hiddenLine xmlns:a14="http://schemas.microsoft.com/office/drawing/2010/main" xmlns="" w="9525">
                   <a:solidFill>
                     <a:srgbClr val="000000"/>
                   </a:solidFill>
@@ -4918,7 +4926,7 @@
           <a:p>
             <a:fld id="{48A87A34-81AB-432B-8DAE-1953F412C126}" type="datetimeFigureOut">
               <a:rPr lang="en-US" dirty="0"/>
-              <a:t>4/4/2021</a:t>
+              <a:t>4/18/2021</a:t>
             </a:fld>
             <a:endParaRPr lang="en-US" dirty="0"/>
           </a:p>
@@ -5180,7 +5188,7 @@
           <a:p>
             <a:fld id="{48A87A34-81AB-432B-8DAE-1953F412C126}" type="datetimeFigureOut">
               <a:rPr lang="en-US" dirty="0"/>
-              <a:t>4/4/2021</a:t>
+              <a:t>4/18/2021</a:t>
             </a:fld>
             <a:endParaRPr lang="en-US" dirty="0"/>
           </a:p>
@@ -5371,7 +5379,7 @@
           <a:p>
             <a:fld id="{48A87A34-81AB-432B-8DAE-1953F412C126}" type="datetimeFigureOut">
               <a:rPr lang="en-US" dirty="0"/>
-              <a:t>4/4/2021</a:t>
+              <a:t>4/18/2021</a:t>
             </a:fld>
             <a:endParaRPr lang="en-US" dirty="0"/>
           </a:p>
@@ -5629,7 +5637,7 @@
           <a:p>
             <a:fld id="{48A87A34-81AB-432B-8DAE-1953F412C126}" type="datetimeFigureOut">
               <a:rPr lang="en-US" dirty="0"/>
-              <a:t>4/4/2021</a:t>
+              <a:t>4/18/2021</a:t>
             </a:fld>
             <a:endParaRPr lang="en-US" dirty="0"/>
           </a:p>
@@ -6058,7 +6066,7 @@
           <a:p>
             <a:fld id="{48A87A34-81AB-432B-8DAE-1953F412C126}" type="datetimeFigureOut">
               <a:rPr lang="en-US" dirty="0"/>
-              <a:t>4/4/2021</a:t>
+              <a:t>4/18/2021</a:t>
             </a:fld>
             <a:endParaRPr lang="en-US" dirty="0"/>
           </a:p>
@@ -6599,7 +6607,7 @@
           <a:p>
             <a:fld id="{48A87A34-81AB-432B-8DAE-1953F412C126}" type="datetimeFigureOut">
               <a:rPr lang="en-US" dirty="0"/>
-              <a:t>4/4/2021</a:t>
+              <a:t>4/18/2021</a:t>
             </a:fld>
             <a:endParaRPr lang="en-US" dirty="0"/>
           </a:p>
@@ -7314,7 +7322,7 @@
           <a:p>
             <a:fld id="{48A87A34-81AB-432B-8DAE-1953F412C126}" type="datetimeFigureOut">
               <a:rPr lang="en-US" dirty="0"/>
-              <a:t>4/4/2021</a:t>
+              <a:t>4/18/2021</a:t>
             </a:fld>
             <a:endParaRPr lang="en-US" dirty="0"/>
           </a:p>
@@ -7479,7 +7487,7 @@
           <a:p>
             <a:fld id="{48A87A34-81AB-432B-8DAE-1953F412C126}" type="datetimeFigureOut">
               <a:rPr lang="en-US" dirty="0"/>
-              <a:t>4/4/2021</a:t>
+              <a:t>4/18/2021</a:t>
             </a:fld>
             <a:endParaRPr lang="en-US" dirty="0"/>
           </a:p>
@@ -7654,7 +7662,7 @@
           <a:p>
             <a:fld id="{48A87A34-81AB-432B-8DAE-1953F412C126}" type="datetimeFigureOut">
               <a:rPr lang="en-US" dirty="0"/>
-              <a:t>4/4/2021</a:t>
+              <a:t>4/18/2021</a:t>
             </a:fld>
             <a:endParaRPr lang="en-US" dirty="0"/>
           </a:p>
@@ -7819,7 +7827,7 @@
           <a:p>
             <a:fld id="{48A87A34-81AB-432B-8DAE-1953F412C126}" type="datetimeFigureOut">
               <a:rPr lang="en-US" dirty="0"/>
-              <a:t>4/4/2021</a:t>
+              <a:t>4/18/2021</a:t>
             </a:fld>
             <a:endParaRPr lang="en-US" dirty="0"/>
           </a:p>
@@ -8064,7 +8072,7 @@
           <a:p>
             <a:fld id="{48A87A34-81AB-432B-8DAE-1953F412C126}" type="datetimeFigureOut">
               <a:rPr lang="en-US" dirty="0"/>
-              <a:t>4/4/2021</a:t>
+              <a:t>4/18/2021</a:t>
             </a:fld>
             <a:endParaRPr lang="en-US" dirty="0"/>
           </a:p>
@@ -8291,7 +8299,7 @@
           <a:p>
             <a:fld id="{48A87A34-81AB-432B-8DAE-1953F412C126}" type="datetimeFigureOut">
               <a:rPr lang="en-US" dirty="0"/>
-              <a:t>4/4/2021</a:t>
+              <a:t>4/18/2021</a:t>
             </a:fld>
             <a:endParaRPr lang="en-US" dirty="0"/>
           </a:p>
@@ -8667,7 +8675,7 @@
           <a:p>
             <a:fld id="{48A87A34-81AB-432B-8DAE-1953F412C126}" type="datetimeFigureOut">
               <a:rPr lang="en-US" dirty="0"/>
-              <a:t>4/4/2021</a:t>
+              <a:t>4/18/2021</a:t>
             </a:fld>
             <a:endParaRPr lang="en-US" dirty="0"/>
           </a:p>
@@ -8780,7 +8788,7 @@
           <a:p>
             <a:fld id="{48A87A34-81AB-432B-8DAE-1953F412C126}" type="datetimeFigureOut">
               <a:rPr lang="en-US" dirty="0"/>
-              <a:t>4/4/2021</a:t>
+              <a:t>4/18/2021</a:t>
             </a:fld>
             <a:endParaRPr lang="en-US" dirty="0"/>
           </a:p>
@@ -8870,7 +8878,7 @@
           <a:p>
             <a:fld id="{48A87A34-81AB-432B-8DAE-1953F412C126}" type="datetimeFigureOut">
               <a:rPr lang="en-US" dirty="0"/>
-              <a:t>4/4/2021</a:t>
+              <a:t>4/18/2021</a:t>
             </a:fld>
             <a:endParaRPr lang="en-US" dirty="0"/>
           </a:p>
@@ -9114,7 +9122,7 @@
           <a:p>
             <a:fld id="{48A87A34-81AB-432B-8DAE-1953F412C126}" type="datetimeFigureOut">
               <a:rPr lang="en-US" dirty="0"/>
-              <a:t>4/4/2021</a:t>
+              <a:t>4/18/2021</a:t>
             </a:fld>
             <a:endParaRPr lang="en-US" dirty="0"/>
           </a:p>
@@ -9389,7 +9397,7 @@
           <a:p>
             <a:fld id="{48A87A34-81AB-432B-8DAE-1953F412C126}" type="datetimeFigureOut">
               <a:rPr lang="en-US" dirty="0"/>
-              <a:t>4/4/2021</a:t>
+              <a:t>4/18/2021</a:t>
             </a:fld>
             <a:endParaRPr lang="en-US" dirty="0"/>
           </a:p>
@@ -9500,7 +9508,7 @@
           <a:noFill/>
           <a:extLst>
             <a:ext uri="{909E8E84-426E-40dd-AFC4-6F175D3DCCD1}">
-              <a14:hiddenFill xmlns="" xmlns:a14="http://schemas.microsoft.com/office/drawing/2010/main">
+              <a14:hiddenFill xmlns:a14="http://schemas.microsoft.com/office/drawing/2010/main" xmlns="">
                 <a:solidFill>
                   <a:srgbClr val="FFFFFF"/>
                 </a:solidFill>
@@ -9574,7 +9582,7 @@
               </a:ln>
               <a:extLst>
                 <a:ext uri="{91240B29-F687-4f45-9708-019B960494DF}">
-                  <a14:hiddenLine xmlns="" xmlns:a14="http://schemas.microsoft.com/office/drawing/2010/main" w="9525">
+                  <a14:hiddenLine xmlns:a14="http://schemas.microsoft.com/office/drawing/2010/main" xmlns="" w="9525">
                     <a:solidFill>
                       <a:srgbClr val="000000"/>
                     </a:solidFill>
@@ -9664,7 +9672,7 @@
               </a:ln>
               <a:extLst>
                 <a:ext uri="{91240B29-F687-4f45-9708-019B960494DF}">
-                  <a14:hiddenLine xmlns="" xmlns:a14="http://schemas.microsoft.com/office/drawing/2010/main" w="9525">
+                  <a14:hiddenLine xmlns:a14="http://schemas.microsoft.com/office/drawing/2010/main" xmlns="" w="9525">
                     <a:solidFill>
                       <a:srgbClr val="000000"/>
                     </a:solidFill>
@@ -9754,7 +9762,7 @@
               </a:ln>
               <a:extLst>
                 <a:ext uri="{91240B29-F687-4f45-9708-019B960494DF}">
-                  <a14:hiddenLine xmlns="" xmlns:a14="http://schemas.microsoft.com/office/drawing/2010/main" w="9525">
+                  <a14:hiddenLine xmlns:a14="http://schemas.microsoft.com/office/drawing/2010/main" xmlns="" w="9525">
                     <a:solidFill>
                       <a:srgbClr val="000000"/>
                     </a:solidFill>
@@ -9816,7 +9824,7 @@
               </a:ln>
               <a:extLst>
                 <a:ext uri="{91240B29-F687-4f45-9708-019B960494DF}">
-                  <a14:hiddenLine xmlns="" xmlns:a14="http://schemas.microsoft.com/office/drawing/2010/main" w="9525">
+                  <a14:hiddenLine xmlns:a14="http://schemas.microsoft.com/office/drawing/2010/main" xmlns="" w="9525">
                     <a:solidFill>
                       <a:srgbClr val="000000"/>
                     </a:solidFill>
@@ -9906,7 +9914,7 @@
               </a:ln>
               <a:extLst>
                 <a:ext uri="{91240B29-F687-4f45-9708-019B960494DF}">
-                  <a14:hiddenLine xmlns="" xmlns:a14="http://schemas.microsoft.com/office/drawing/2010/main" w="9525">
+                  <a14:hiddenLine xmlns:a14="http://schemas.microsoft.com/office/drawing/2010/main" xmlns="" w="9525">
                     <a:solidFill>
                       <a:srgbClr val="000000"/>
                     </a:solidFill>
@@ -9968,7 +9976,7 @@
               </a:ln>
               <a:extLst>
                 <a:ext uri="{91240B29-F687-4f45-9708-019B960494DF}">
-                  <a14:hiddenLine xmlns="" xmlns:a14="http://schemas.microsoft.com/office/drawing/2010/main" w="9525">
+                  <a14:hiddenLine xmlns:a14="http://schemas.microsoft.com/office/drawing/2010/main" xmlns="" w="9525">
                     <a:solidFill>
                       <a:srgbClr val="000000"/>
                     </a:solidFill>
@@ -10030,7 +10038,7 @@
               </a:ln>
               <a:extLst>
                 <a:ext uri="{91240B29-F687-4f45-9708-019B960494DF}">
-                  <a14:hiddenLine xmlns="" xmlns:a14="http://schemas.microsoft.com/office/drawing/2010/main" w="9525">
+                  <a14:hiddenLine xmlns:a14="http://schemas.microsoft.com/office/drawing/2010/main" xmlns="" w="9525">
                     <a:solidFill>
                       <a:srgbClr val="000000"/>
                     </a:solidFill>
@@ -10120,7 +10128,7 @@
               </a:ln>
               <a:extLst>
                 <a:ext uri="{91240B29-F687-4f45-9708-019B960494DF}">
-                  <a14:hiddenLine xmlns="" xmlns:a14="http://schemas.microsoft.com/office/drawing/2010/main" w="9525">
+                  <a14:hiddenLine xmlns:a14="http://schemas.microsoft.com/office/drawing/2010/main" xmlns="" w="9525">
                     <a:solidFill>
                       <a:srgbClr val="000000"/>
                     </a:solidFill>
@@ -10210,7 +10218,7 @@
               </a:ln>
               <a:extLst>
                 <a:ext uri="{91240B29-F687-4f45-9708-019B960494DF}">
-                  <a14:hiddenLine xmlns="" xmlns:a14="http://schemas.microsoft.com/office/drawing/2010/main" w="9525">
+                  <a14:hiddenLine xmlns:a14="http://schemas.microsoft.com/office/drawing/2010/main" xmlns="" w="9525">
                     <a:solidFill>
                       <a:srgbClr val="000000"/>
                     </a:solidFill>
@@ -10272,7 +10280,7 @@
               </a:ln>
               <a:extLst>
                 <a:ext uri="{91240B29-F687-4f45-9708-019B960494DF}">
-                  <a14:hiddenLine xmlns="" xmlns:a14="http://schemas.microsoft.com/office/drawing/2010/main" w="9525">
+                  <a14:hiddenLine xmlns:a14="http://schemas.microsoft.com/office/drawing/2010/main" xmlns="" w="9525">
                     <a:solidFill>
                       <a:srgbClr val="000000"/>
                     </a:solidFill>
@@ -10382,7 +10390,7 @@
               </a:ln>
               <a:extLst>
                 <a:ext uri="{91240B29-F687-4f45-9708-019B960494DF}">
-                  <a14:hiddenLine xmlns="" xmlns:a14="http://schemas.microsoft.com/office/drawing/2010/main" w="9525">
+                  <a14:hiddenLine xmlns:a14="http://schemas.microsoft.com/office/drawing/2010/main" xmlns="" w="9525">
                     <a:solidFill>
                       <a:srgbClr val="000000"/>
                     </a:solidFill>
@@ -10466,7 +10474,7 @@
               </a:ln>
               <a:extLst>
                 <a:ext uri="{91240B29-F687-4f45-9708-019B960494DF}">
-                  <a14:hiddenLine xmlns="" xmlns:a14="http://schemas.microsoft.com/office/drawing/2010/main" w="9525">
+                  <a14:hiddenLine xmlns:a14="http://schemas.microsoft.com/office/drawing/2010/main" xmlns="" w="9525">
                     <a:solidFill>
                       <a:srgbClr val="000000"/>
                     </a:solidFill>
@@ -10528,7 +10536,7 @@
               </a:ln>
               <a:extLst>
                 <a:ext uri="{91240B29-F687-4f45-9708-019B960494DF}">
-                  <a14:hiddenLine xmlns="" xmlns:a14="http://schemas.microsoft.com/office/drawing/2010/main" w="9525">
+                  <a14:hiddenLine xmlns:a14="http://schemas.microsoft.com/office/drawing/2010/main" xmlns="" w="9525">
                     <a:solidFill>
                       <a:srgbClr val="000000"/>
                     </a:solidFill>
@@ -10590,7 +10598,7 @@
               </a:ln>
               <a:extLst>
                 <a:ext uri="{91240B29-F687-4f45-9708-019B960494DF}">
-                  <a14:hiddenLine xmlns="" xmlns:a14="http://schemas.microsoft.com/office/drawing/2010/main" w="9525">
+                  <a14:hiddenLine xmlns:a14="http://schemas.microsoft.com/office/drawing/2010/main" xmlns="" w="9525">
                     <a:solidFill>
                       <a:srgbClr val="000000"/>
                     </a:solidFill>
@@ -10680,7 +10688,7 @@
               </a:ln>
               <a:extLst>
                 <a:ext uri="{91240B29-F687-4f45-9708-019B960494DF}">
-                  <a14:hiddenLine xmlns="" xmlns:a14="http://schemas.microsoft.com/office/drawing/2010/main" w="9525">
+                  <a14:hiddenLine xmlns:a14="http://schemas.microsoft.com/office/drawing/2010/main" xmlns="" w="9525">
                     <a:solidFill>
                       <a:srgbClr val="000000"/>
                     </a:solidFill>
@@ -10714,7 +10722,7 @@
               </a:ln>
               <a:extLst>
                 <a:ext uri="{91240B29-F687-4f45-9708-019B960494DF}">
-                  <a14:hiddenLine xmlns="" xmlns:a14="http://schemas.microsoft.com/office/drawing/2010/main" w="9525">
+                  <a14:hiddenLine xmlns:a14="http://schemas.microsoft.com/office/drawing/2010/main" xmlns="" w="9525">
                     <a:solidFill>
                       <a:srgbClr val="000000"/>
                     </a:solidFill>
@@ -10779,7 +10787,7 @@
               </a:ln>
               <a:extLst>
                 <a:ext uri="{91240B29-F687-4f45-9708-019B960494DF}">
-                  <a14:hiddenLine xmlns="" xmlns:a14="http://schemas.microsoft.com/office/drawing/2010/main" w="9525">
+                  <a14:hiddenLine xmlns:a14="http://schemas.microsoft.com/office/drawing/2010/main" xmlns="" w="9525">
                     <a:solidFill>
                       <a:srgbClr val="000000"/>
                     </a:solidFill>
@@ -10869,7 +10877,7 @@
               </a:ln>
               <a:extLst>
                 <a:ext uri="{91240B29-F687-4f45-9708-019B960494DF}">
-                  <a14:hiddenLine xmlns="" xmlns:a14="http://schemas.microsoft.com/office/drawing/2010/main" w="9525">
+                  <a14:hiddenLine xmlns:a14="http://schemas.microsoft.com/office/drawing/2010/main" xmlns="" w="9525">
                     <a:solidFill>
                       <a:srgbClr val="000000"/>
                     </a:solidFill>
@@ -10931,7 +10939,7 @@
               </a:ln>
               <a:extLst>
                 <a:ext uri="{91240B29-F687-4f45-9708-019B960494DF}">
-                  <a14:hiddenLine xmlns="" xmlns:a14="http://schemas.microsoft.com/office/drawing/2010/main" w="9525">
+                  <a14:hiddenLine xmlns:a14="http://schemas.microsoft.com/office/drawing/2010/main" xmlns="" w="9525">
                     <a:solidFill>
                       <a:srgbClr val="000000"/>
                     </a:solidFill>
@@ -11021,7 +11029,7 @@
               </a:ln>
               <a:extLst>
                 <a:ext uri="{91240B29-F687-4f45-9708-019B960494DF}">
-                  <a14:hiddenLine xmlns="" xmlns:a14="http://schemas.microsoft.com/office/drawing/2010/main" w="9525">
+                  <a14:hiddenLine xmlns:a14="http://schemas.microsoft.com/office/drawing/2010/main" xmlns="" w="9525">
                     <a:solidFill>
                       <a:srgbClr val="000000"/>
                     </a:solidFill>
@@ -11086,7 +11094,7 @@
               </a:ln>
               <a:extLst>
                 <a:ext uri="{91240B29-F687-4f45-9708-019B960494DF}">
-                  <a14:hiddenLine xmlns="" xmlns:a14="http://schemas.microsoft.com/office/drawing/2010/main" w="9525">
+                  <a14:hiddenLine xmlns:a14="http://schemas.microsoft.com/office/drawing/2010/main" xmlns="" w="9525">
                     <a:solidFill>
                       <a:srgbClr val="000000"/>
                     </a:solidFill>
@@ -11148,7 +11156,7 @@
               </a:ln>
               <a:extLst>
                 <a:ext uri="{91240B29-F687-4f45-9708-019B960494DF}">
-                  <a14:hiddenLine xmlns="" xmlns:a14="http://schemas.microsoft.com/office/drawing/2010/main" w="9525">
+                  <a14:hiddenLine xmlns:a14="http://schemas.microsoft.com/office/drawing/2010/main" xmlns="" w="9525">
                     <a:solidFill>
                       <a:srgbClr val="000000"/>
                     </a:solidFill>
@@ -11238,7 +11246,7 @@
               </a:ln>
               <a:extLst>
                 <a:ext uri="{91240B29-F687-4f45-9708-019B960494DF}">
-                  <a14:hiddenLine xmlns="" xmlns:a14="http://schemas.microsoft.com/office/drawing/2010/main" w="9525">
+                  <a14:hiddenLine xmlns:a14="http://schemas.microsoft.com/office/drawing/2010/main" xmlns="" w="9525">
                     <a:solidFill>
                       <a:srgbClr val="000000"/>
                     </a:solidFill>
@@ -11328,7 +11336,7 @@
               </a:ln>
               <a:extLst>
                 <a:ext uri="{91240B29-F687-4f45-9708-019B960494DF}">
-                  <a14:hiddenLine xmlns="" xmlns:a14="http://schemas.microsoft.com/office/drawing/2010/main" w="9525">
+                  <a14:hiddenLine xmlns:a14="http://schemas.microsoft.com/office/drawing/2010/main" xmlns="" w="9525">
                     <a:solidFill>
                       <a:srgbClr val="000000"/>
                     </a:solidFill>
@@ -11393,7 +11401,7 @@
               </a:ln>
               <a:extLst>
                 <a:ext uri="{91240B29-F687-4f45-9708-019B960494DF}">
-                  <a14:hiddenLine xmlns="" xmlns:a14="http://schemas.microsoft.com/office/drawing/2010/main" w="9525">
+                  <a14:hiddenLine xmlns:a14="http://schemas.microsoft.com/office/drawing/2010/main" xmlns="" w="9525">
                     <a:solidFill>
                       <a:srgbClr val="000000"/>
                     </a:solidFill>
@@ -11513,7 +11521,7 @@
               </a:ln>
               <a:extLst>
                 <a:ext uri="{91240B29-F687-4f45-9708-019B960494DF}">
-                  <a14:hiddenLine xmlns="" xmlns:a14="http://schemas.microsoft.com/office/drawing/2010/main" w="9525">
+                  <a14:hiddenLine xmlns:a14="http://schemas.microsoft.com/office/drawing/2010/main" xmlns="" w="9525">
                     <a:solidFill>
                       <a:srgbClr val="000000"/>
                     </a:solidFill>
@@ -11611,7 +11619,7 @@
               </a:ln>
               <a:extLst>
                 <a:ext uri="{91240B29-F687-4f45-9708-019B960494DF}">
-                  <a14:hiddenLine xmlns="" xmlns:a14="http://schemas.microsoft.com/office/drawing/2010/main" w="9525">
+                  <a14:hiddenLine xmlns:a14="http://schemas.microsoft.com/office/drawing/2010/main" xmlns="" w="9525">
                     <a:solidFill>
                       <a:srgbClr val="000000"/>
                     </a:solidFill>
@@ -11726,7 +11734,7 @@
               </a:ln>
               <a:extLst>
                 <a:ext uri="{91240B29-F687-4f45-9708-019B960494DF}">
-                  <a14:hiddenLine xmlns="" xmlns:a14="http://schemas.microsoft.com/office/drawing/2010/main" w="9525">
+                  <a14:hiddenLine xmlns:a14="http://schemas.microsoft.com/office/drawing/2010/main" xmlns="" w="9525">
                     <a:solidFill>
                       <a:srgbClr val="000000"/>
                     </a:solidFill>
@@ -11816,7 +11824,7 @@
               </a:ln>
               <a:extLst>
                 <a:ext uri="{91240B29-F687-4f45-9708-019B960494DF}">
-                  <a14:hiddenLine xmlns="" xmlns:a14="http://schemas.microsoft.com/office/drawing/2010/main" w="9525">
+                  <a14:hiddenLine xmlns:a14="http://schemas.microsoft.com/office/drawing/2010/main" xmlns="" w="9525">
                     <a:solidFill>
                       <a:srgbClr val="000000"/>
                     </a:solidFill>
@@ -11881,7 +11889,7 @@
               </a:ln>
               <a:extLst>
                 <a:ext uri="{91240B29-F687-4f45-9708-019B960494DF}">
-                  <a14:hiddenLine xmlns="" xmlns:a14="http://schemas.microsoft.com/office/drawing/2010/main" w="9525">
+                  <a14:hiddenLine xmlns:a14="http://schemas.microsoft.com/office/drawing/2010/main" xmlns="" w="9525">
                     <a:solidFill>
                       <a:srgbClr val="000000"/>
                     </a:solidFill>
@@ -11971,7 +11979,7 @@
               </a:ln>
               <a:extLst>
                 <a:ext uri="{91240B29-F687-4f45-9708-019B960494DF}">
-                  <a14:hiddenLine xmlns="" xmlns:a14="http://schemas.microsoft.com/office/drawing/2010/main" w="9525">
+                  <a14:hiddenLine xmlns:a14="http://schemas.microsoft.com/office/drawing/2010/main" xmlns="" w="9525">
                     <a:solidFill>
                       <a:srgbClr val="000000"/>
                     </a:solidFill>
@@ -12039,7 +12047,7 @@
               </a:ln>
               <a:extLst>
                 <a:ext uri="{91240B29-F687-4f45-9708-019B960494DF}">
-                  <a14:hiddenLine xmlns="" xmlns:a14="http://schemas.microsoft.com/office/drawing/2010/main" w="9525">
+                  <a14:hiddenLine xmlns:a14="http://schemas.microsoft.com/office/drawing/2010/main" xmlns="" w="9525">
                     <a:solidFill>
                       <a:srgbClr val="000000"/>
                     </a:solidFill>
@@ -12129,7 +12137,7 @@
               </a:ln>
               <a:extLst>
                 <a:ext uri="{91240B29-F687-4f45-9708-019B960494DF}">
-                  <a14:hiddenLine xmlns="" xmlns:a14="http://schemas.microsoft.com/office/drawing/2010/main" w="9525">
+                  <a14:hiddenLine xmlns:a14="http://schemas.microsoft.com/office/drawing/2010/main" xmlns="" w="9525">
                     <a:solidFill>
                       <a:srgbClr val="000000"/>
                     </a:solidFill>
@@ -12197,7 +12205,7 @@
               </a:ln>
               <a:extLst>
                 <a:ext uri="{91240B29-F687-4f45-9708-019B960494DF}">
-                  <a14:hiddenLine xmlns="" xmlns:a14="http://schemas.microsoft.com/office/drawing/2010/main" w="9525">
+                  <a14:hiddenLine xmlns:a14="http://schemas.microsoft.com/office/drawing/2010/main" xmlns="" w="9525">
                     <a:solidFill>
                       <a:srgbClr val="000000"/>
                     </a:solidFill>
@@ -12287,7 +12295,7 @@
               </a:ln>
               <a:extLst>
                 <a:ext uri="{91240B29-F687-4f45-9708-019B960494DF}">
-                  <a14:hiddenLine xmlns="" xmlns:a14="http://schemas.microsoft.com/office/drawing/2010/main" w="9525">
+                  <a14:hiddenLine xmlns:a14="http://schemas.microsoft.com/office/drawing/2010/main" xmlns="" w="9525">
                     <a:solidFill>
                       <a:srgbClr val="000000"/>
                     </a:solidFill>
@@ -12321,7 +12329,7 @@
               </a:ln>
               <a:extLst>
                 <a:ext uri="{91240B29-F687-4f45-9708-019B960494DF}">
-                  <a14:hiddenLine xmlns="" xmlns:a14="http://schemas.microsoft.com/office/drawing/2010/main" w="9525">
+                  <a14:hiddenLine xmlns:a14="http://schemas.microsoft.com/office/drawing/2010/main" xmlns="" w="9525">
                     <a:solidFill>
                       <a:srgbClr val="000000"/>
                     </a:solidFill>
@@ -12462,7 +12470,7 @@
             <a:fld id="{48A87A34-81AB-432B-8DAE-1953F412C126}" type="datetimeFigureOut">
               <a:rPr lang="en-US" dirty="0"/>
               <a:pPr/>
-              <a:t>4/4/2021</a:t>
+              <a:t>4/18/2021</a:t>
             </a:fld>
             <a:endParaRPr lang="en-US" dirty="0"/>
           </a:p>
@@ -13264,13 +13272,7 @@
                       <a:rPr lang="pt-BR" i="1">
                         <a:latin typeface="Cambria Math" panose="02040503050406030204" pitchFamily="18" charset="0"/>
                       </a:rPr>
-                      <m:t>,…</m:t>
-                    </m:r>
-                    <m:r>
-                      <a:rPr lang="pt-BR" i="1">
-                        <a:latin typeface="Cambria Math" panose="02040503050406030204" pitchFamily="18" charset="0"/>
-                      </a:rPr>
-                      <m:t> </m:t>
+                      <m:t>,… </m:t>
                     </m:r>
                   </m:oMath>
                 </a14:m>
@@ -13504,10 +13506,10 @@
                       </m:e>
                       <m:sub>
                         <m:r>
-                          <a:rPr lang="en-US" b="0" i="1" smtClean="0">
-                            <a:latin typeface="Cambria Math" panose="02040503050406030204" pitchFamily="18" charset="0"/>
-                          </a:rPr>
-                          <m:t>𝑛</m:t>
+                          <a:rPr lang="pt-BR" b="0" i="1" smtClean="0">
+                            <a:latin typeface="Cambria Math" panose="02040503050406030204" pitchFamily="18" charset="0"/>
+                          </a:rPr>
+                          <m:t>𝑚</m:t>
                         </m:r>
                         <m:r>
                           <a:rPr lang="en-US" b="0" i="1" smtClean="0">
@@ -13572,10 +13574,10 @@
                       </m:e>
                       <m:sub>
                         <m:r>
-                          <a:rPr lang="en-US" b="0" i="1" smtClean="0">
-                            <a:latin typeface="Cambria Math" panose="02040503050406030204" pitchFamily="18" charset="0"/>
-                          </a:rPr>
-                          <m:t>𝑛</m:t>
+                          <a:rPr lang="pt-BR" b="0" i="1" smtClean="0">
+                            <a:latin typeface="Cambria Math" panose="02040503050406030204" pitchFamily="18" charset="0"/>
+                          </a:rPr>
+                          <m:t>𝑚</m:t>
                         </m:r>
                         <m:r>
                           <a:rPr lang="en-US" b="0" i="1" smtClean="0">
@@ -13672,10 +13674,10 @@
                       </m:e>
                       <m:sub>
                         <m:r>
-                          <a:rPr lang="en-US" b="0" i="1" smtClean="0">
-                            <a:latin typeface="Cambria Math" panose="02040503050406030204" pitchFamily="18" charset="0"/>
-                          </a:rPr>
-                          <m:t>𝑛</m:t>
+                          <a:rPr lang="pt-BR" b="0" i="1" smtClean="0">
+                            <a:latin typeface="Cambria Math" panose="02040503050406030204" pitchFamily="18" charset="0"/>
+                          </a:rPr>
+                          <m:t>𝑚</m:t>
                         </m:r>
                         <m:r>
                           <a:rPr lang="en-US" b="0" i="1" smtClean="0">
@@ -13740,10 +13742,10 @@
                       </m:e>
                       <m:sub>
                         <m:r>
-                          <a:rPr lang="en-US" b="0" i="1" smtClean="0">
-                            <a:latin typeface="Cambria Math" panose="02040503050406030204" pitchFamily="18" charset="0"/>
-                          </a:rPr>
-                          <m:t>𝑛</m:t>
+                          <a:rPr lang="pt-BR" b="0" i="1" smtClean="0">
+                            <a:latin typeface="Cambria Math" panose="02040503050406030204" pitchFamily="18" charset="0"/>
+                          </a:rPr>
+                          <m:t>𝑚</m:t>
                         </m:r>
                         <m:r>
                           <a:rPr lang="en-US" b="0" i="1" smtClean="0">
@@ -13808,10 +13810,10 @@
                       </m:e>
                       <m:sub>
                         <m:r>
-                          <a:rPr lang="en-US" b="0" i="1" smtClean="0">
-                            <a:latin typeface="Cambria Math" panose="02040503050406030204" pitchFamily="18" charset="0"/>
-                          </a:rPr>
-                          <m:t>𝑛</m:t>
+                          <a:rPr lang="pt-BR" b="0" i="1" smtClean="0">
+                            <a:latin typeface="Cambria Math" panose="02040503050406030204" pitchFamily="18" charset="0"/>
+                          </a:rPr>
+                          <m:t>𝑚</m:t>
                         </m:r>
                         <m:r>
                           <a:rPr lang="en-US" b="0" i="1" smtClean="0">
@@ -13898,10 +13900,10 @@
                           <m:t>≤</m:t>
                         </m:r>
                         <m:r>
-                          <a:rPr lang="en-US" b="0" i="1" smtClean="0">
-                            <a:latin typeface="Cambria Math" panose="02040503050406030204" pitchFamily="18" charset="0"/>
-                          </a:rPr>
-                          <m:t>𝑛</m:t>
+                          <a:rPr lang="pt-BR" b="0" i="1" smtClean="0">
+                            <a:latin typeface="Cambria Math" panose="02040503050406030204" pitchFamily="18" charset="0"/>
+                          </a:rPr>
+                          <m:t>𝑚</m:t>
                         </m:r>
                         <m:r>
                           <a:rPr lang="en-US" b="0" i="1" smtClean="0">
@@ -14262,10 +14264,10 @@
                       </m:e>
                       <m:sub>
                         <m:r>
-                          <a:rPr lang="en-US" i="1">
-                            <a:latin typeface="Cambria Math" panose="02040503050406030204" pitchFamily="18" charset="0"/>
-                          </a:rPr>
-                          <m:t>𝑛</m:t>
+                          <a:rPr lang="pt-BR" b="0" i="1" smtClean="0">
+                            <a:latin typeface="Cambria Math" panose="02040503050406030204" pitchFamily="18" charset="0"/>
+                          </a:rPr>
+                          <m:t>𝑚</m:t>
                         </m:r>
                         <m:r>
                           <a:rPr lang="en-US" i="1">
@@ -14330,10 +14332,10 @@
                       </m:e>
                       <m:sub>
                         <m:r>
-                          <a:rPr lang="en-US" i="1">
-                            <a:latin typeface="Cambria Math" panose="02040503050406030204" pitchFamily="18" charset="0"/>
-                          </a:rPr>
-                          <m:t>𝑛</m:t>
+                          <a:rPr lang="pt-BR" b="0" i="1" smtClean="0">
+                            <a:latin typeface="Cambria Math" panose="02040503050406030204" pitchFamily="18" charset="0"/>
+                          </a:rPr>
+                          <m:t>𝑚</m:t>
                         </m:r>
                         <m:r>
                           <a:rPr lang="en-US" i="1">
@@ -14432,10 +14434,10 @@
                       </m:e>
                       <m:sub>
                         <m:r>
-                          <a:rPr lang="en-US" i="1">
-                            <a:latin typeface="Cambria Math" panose="02040503050406030204" pitchFamily="18" charset="0"/>
-                          </a:rPr>
-                          <m:t>𝑛</m:t>
+                          <a:rPr lang="pt-BR" b="0" i="1" smtClean="0">
+                            <a:latin typeface="Cambria Math" panose="02040503050406030204" pitchFamily="18" charset="0"/>
+                          </a:rPr>
+                          <m:t>𝑚</m:t>
                         </m:r>
                         <m:r>
                           <a:rPr lang="en-US" i="1">
@@ -14500,10 +14502,10 @@
                       </m:e>
                       <m:sub>
                         <m:r>
-                          <a:rPr lang="en-US" i="1">
-                            <a:latin typeface="Cambria Math" panose="02040503050406030204" pitchFamily="18" charset="0"/>
-                          </a:rPr>
-                          <m:t>𝑛</m:t>
+                          <a:rPr lang="pt-BR" b="0" i="1" smtClean="0">
+                            <a:latin typeface="Cambria Math" panose="02040503050406030204" pitchFamily="18" charset="0"/>
+                          </a:rPr>
+                          <m:t>𝑚</m:t>
                         </m:r>
                         <m:r>
                           <a:rPr lang="en-US" i="1">
@@ -14602,10 +14604,10 @@
                       </m:e>
                       <m:sub>
                         <m:r>
-                          <a:rPr lang="en-US" i="1" smtClean="0">
-                            <a:latin typeface="Cambria Math" panose="02040503050406030204" pitchFamily="18" charset="0"/>
-                          </a:rPr>
-                          <m:t>𝑛</m:t>
+                          <a:rPr lang="pt-BR" b="0" i="1" smtClean="0">
+                            <a:latin typeface="Cambria Math" panose="02040503050406030204" pitchFamily="18" charset="0"/>
+                          </a:rPr>
+                          <m:t>𝑚</m:t>
                         </m:r>
                         <m:r>
                           <a:rPr lang="en-US" i="1" smtClean="0">
@@ -14670,10 +14672,10 @@
                       </m:e>
                       <m:sub>
                         <m:r>
-                          <a:rPr lang="en-US" b="0" i="1" smtClean="0">
-                            <a:latin typeface="Cambria Math" panose="02040503050406030204" pitchFamily="18" charset="0"/>
-                          </a:rPr>
-                          <m:t>𝑛</m:t>
+                          <a:rPr lang="pt-BR" b="0" i="1" smtClean="0">
+                            <a:latin typeface="Cambria Math" panose="02040503050406030204" pitchFamily="18" charset="0"/>
+                          </a:rPr>
+                          <m:t>𝑚</m:t>
                         </m:r>
                         <m:r>
                           <a:rPr lang="en-US" b="0" i="1" smtClean="0">
@@ -14718,24 +14720,6 @@
                             <a:latin typeface="Cambria Math" panose="02040503050406030204" pitchFamily="18" charset="0"/>
                           </a:rPr>
                           <m:t>𝑖</m:t>
-                        </m:r>
-                        <m:r>
-                          <a:rPr lang="en-US" b="0" i="1" smtClean="0">
-                            <a:latin typeface="Cambria Math" panose="02040503050406030204" pitchFamily="18" charset="0"/>
-                          </a:rPr>
-                          <m:t>≥</m:t>
-                        </m:r>
-                        <m:r>
-                          <a:rPr lang="en-US" b="0" i="1" smtClean="0">
-                            <a:latin typeface="Cambria Math" panose="02040503050406030204" pitchFamily="18" charset="0"/>
-                          </a:rPr>
-                          <m:t>𝑚</m:t>
-                        </m:r>
-                        <m:r>
-                          <a:rPr lang="en-US" b="0" i="1" smtClean="0">
-                            <a:latin typeface="Cambria Math" panose="02040503050406030204" pitchFamily="18" charset="0"/>
-                          </a:rPr>
-                          <m:t>−1</m:t>
                         </m:r>
                       </m:sub>
                     </m:sSub>
@@ -15092,24 +15076,6 @@
                           </a:rPr>
                           <m:t>𝑖</m:t>
                         </m:r>
-                        <m:r>
-                          <a:rPr lang="en-US" sz="3200" i="1">
-                            <a:latin typeface="Cambria Math" panose="02040503050406030204" pitchFamily="18" charset="0"/>
-                          </a:rPr>
-                          <m:t>≥</m:t>
-                        </m:r>
-                        <m:r>
-                          <a:rPr lang="en-US" sz="3200" i="1">
-                            <a:latin typeface="Cambria Math" panose="02040503050406030204" pitchFamily="18" charset="0"/>
-                          </a:rPr>
-                          <m:t>𝑚</m:t>
-                        </m:r>
-                        <m:r>
-                          <a:rPr lang="en-US" sz="3200" i="1">
-                            <a:latin typeface="Cambria Math" panose="02040503050406030204" pitchFamily="18" charset="0"/>
-                          </a:rPr>
-                          <m:t>−1</m:t>
-                        </m:r>
                       </m:sub>
                     </m:sSub>
                     <m:r>
@@ -15286,8 +15252,8 @@
           </p:sp>
         </mc:Fallback>
       </mc:AlternateContent>
-      <mc:AlternateContent xmlns:mc="http://schemas.openxmlformats.org/markup-compatibility/2006">
-        <mc:Choice xmlns:a14="http://schemas.microsoft.com/office/drawing/2010/main" Requires="a14">
+      <mc:AlternateContent xmlns:mc="http://schemas.openxmlformats.org/markup-compatibility/2006" xmlns:a14="http://schemas.microsoft.com/office/drawing/2010/main">
+        <mc:Choice Requires="a14">
           <p:sp>
             <p:nvSpPr>
               <p:cNvPr id="7" name="Content Placeholder 2">
@@ -15489,7 +15455,6 @@
                 </a:lvl9pPr>
               </a:lstStyle>
               <a:p>
-                <a:pPr/>
                 <a14:m>
                   <m:oMath xmlns:m="http://schemas.openxmlformats.org/officeDocument/2006/math">
                     <m:sSub>
@@ -15673,7 +15638,7 @@
             </p:txBody>
           </p:sp>
         </mc:Choice>
-        <mc:Fallback>
+        <mc:Fallback xmlns="">
           <p:sp>
             <p:nvSpPr>
               <p:cNvPr id="7" name="Content Placeholder 2">
@@ -15718,8 +15683,8 @@
           </p:sp>
         </mc:Fallback>
       </mc:AlternateContent>
-      <mc:AlternateContent xmlns:mc="http://schemas.openxmlformats.org/markup-compatibility/2006">
-        <mc:Choice xmlns:a14="http://schemas.microsoft.com/office/drawing/2010/main" Requires="a14">
+      <mc:AlternateContent xmlns:mc="http://schemas.openxmlformats.org/markup-compatibility/2006" xmlns:a14="http://schemas.microsoft.com/office/drawing/2010/main">
+        <mc:Choice Requires="a14">
           <p:sp>
             <p:nvSpPr>
               <p:cNvPr id="5" name="Content Placeholder 2">
@@ -16165,7 +16130,7 @@
             </p:txBody>
           </p:sp>
         </mc:Choice>
-        <mc:Fallback>
+        <mc:Fallback xmlns="">
           <p:sp>
             <p:nvSpPr>
               <p:cNvPr id="5" name="Content Placeholder 2">
@@ -16285,8 +16250,8 @@
           </a:p>
         </p:txBody>
       </p:sp>
-      <mc:AlternateContent xmlns:mc="http://schemas.openxmlformats.org/markup-compatibility/2006" xmlns:a14="http://schemas.microsoft.com/office/drawing/2010/main">
-        <mc:Choice Requires="a14">
+      <mc:AlternateContent xmlns:mc="http://schemas.openxmlformats.org/markup-compatibility/2006">
+        <mc:Choice xmlns:a14="http://schemas.microsoft.com/office/drawing/2010/main" Requires="a14">
           <p:sp>
             <p:nvSpPr>
               <p:cNvPr id="3" name="Content Placeholder 2">
@@ -16340,24 +16305,6 @@
                           </a:rPr>
                           <m:t>𝑖</m:t>
                         </m:r>
-                        <m:r>
-                          <a:rPr lang="en-US" sz="3200" i="1">
-                            <a:latin typeface="Cambria Math" panose="02040503050406030204" pitchFamily="18" charset="0"/>
-                          </a:rPr>
-                          <m:t>≥</m:t>
-                        </m:r>
-                        <m:r>
-                          <a:rPr lang="en-US" sz="3200" i="1">
-                            <a:latin typeface="Cambria Math" panose="02040503050406030204" pitchFamily="18" charset="0"/>
-                          </a:rPr>
-                          <m:t>𝑚</m:t>
-                        </m:r>
-                        <m:r>
-                          <a:rPr lang="en-US" sz="3200" i="1">
-                            <a:latin typeface="Cambria Math" panose="02040503050406030204" pitchFamily="18" charset="0"/>
-                          </a:rPr>
-                          <m:t>−1</m:t>
-                        </m:r>
                       </m:sub>
                     </m:sSub>
                     <m:r>
@@ -16490,7 +16437,7 @@
             </p:txBody>
           </p:sp>
         </mc:Choice>
-        <mc:Fallback xmlns="">
+        <mc:Fallback>
           <p:sp>
             <p:nvSpPr>
               <p:cNvPr id="3" name="Content Placeholder 2">
@@ -17016,24 +16963,6 @@
                           </a:rPr>
                           <m:t>𝑖</m:t>
                         </m:r>
-                        <m:r>
-                          <a:rPr lang="en-US" i="1">
-                            <a:latin typeface="Cambria Math" panose="02040503050406030204" pitchFamily="18" charset="0"/>
-                          </a:rPr>
-                          <m:t>≥</m:t>
-                        </m:r>
-                        <m:r>
-                          <a:rPr lang="en-US" i="1">
-                            <a:latin typeface="Cambria Math" panose="02040503050406030204" pitchFamily="18" charset="0"/>
-                          </a:rPr>
-                          <m:t>𝑚</m:t>
-                        </m:r>
-                        <m:r>
-                          <a:rPr lang="en-US" i="1">
-                            <a:latin typeface="Cambria Math" panose="02040503050406030204" pitchFamily="18" charset="0"/>
-                          </a:rPr>
-                          <m:t>−1</m:t>
-                        </m:r>
                       </m:sub>
                     </m:sSub>
                     <m:r>
@@ -17286,8 +17215,8 @@
           </p:sp>
         </mc:Fallback>
       </mc:AlternateContent>
-      <mc:AlternateContent xmlns:mc="http://schemas.openxmlformats.org/markup-compatibility/2006">
-        <mc:Choice xmlns:a14="http://schemas.microsoft.com/office/drawing/2010/main" Requires="a14">
+      <mc:AlternateContent xmlns:mc="http://schemas.openxmlformats.org/markup-compatibility/2006" xmlns:a14="http://schemas.microsoft.com/office/drawing/2010/main">
+        <mc:Choice Requires="a14">
           <p:sp>
             <p:nvSpPr>
               <p:cNvPr id="6" name="Content Placeholder 2">
@@ -17489,7 +17418,6 @@
                 </a:lvl9pPr>
               </a:lstStyle>
               <a:p>
-                <a:pPr/>
                 <a14:m>
                   <m:oMath xmlns:m="http://schemas.openxmlformats.org/officeDocument/2006/math">
                     <m:sSub>
@@ -17673,7 +17601,7 @@
             </p:txBody>
           </p:sp>
         </mc:Choice>
-        <mc:Fallback>
+        <mc:Fallback xmlns="">
           <p:sp>
             <p:nvSpPr>
               <p:cNvPr id="6" name="Content Placeholder 2">
@@ -17785,8 +17713,8 @@
           </a:p>
         </p:txBody>
       </p:sp>
-      <mc:AlternateContent xmlns:mc="http://schemas.openxmlformats.org/markup-compatibility/2006" xmlns:a14="http://schemas.microsoft.com/office/drawing/2010/main">
-        <mc:Choice Requires="a14">
+      <mc:AlternateContent xmlns:mc="http://schemas.openxmlformats.org/markup-compatibility/2006">
+        <mc:Choice xmlns:a14="http://schemas.microsoft.com/office/drawing/2010/main" Requires="a14">
           <p:sp>
             <p:nvSpPr>
               <p:cNvPr id="6" name="Content Placeholder 5">
@@ -18090,24 +18018,6 @@
                               </a:rPr>
                               <m:t>𝑖</m:t>
                             </m:r>
-                            <m:r>
-                              <a:rPr lang="en-US" i="1">
-                                <a:latin typeface="Cambria Math" panose="02040503050406030204" pitchFamily="18" charset="0"/>
-                              </a:rPr>
-                              <m:t>≥</m:t>
-                            </m:r>
-                            <m:r>
-                              <a:rPr lang="en-US" i="1">
-                                <a:latin typeface="Cambria Math" panose="02040503050406030204" pitchFamily="18" charset="0"/>
-                              </a:rPr>
-                              <m:t>𝑚</m:t>
-                            </m:r>
-                            <m:r>
-                              <a:rPr lang="en-US" i="1">
-                                <a:latin typeface="Cambria Math" panose="02040503050406030204" pitchFamily="18" charset="0"/>
-                              </a:rPr>
-                              <m:t>−1</m:t>
-                            </m:r>
                           </m:sub>
                         </m:sSub>
                         <m:r>
@@ -18215,7 +18125,7 @@
             </p:txBody>
           </p:sp>
         </mc:Choice>
-        <mc:Fallback xmlns="">
+        <mc:Fallback>
           <p:sp>
             <p:nvSpPr>
               <p:cNvPr id="6" name="Content Placeholder 5">
@@ -18326,8 +18236,8 @@
           </a:p>
         </p:txBody>
       </p:sp>
-      <mc:AlternateContent xmlns:mc="http://schemas.openxmlformats.org/markup-compatibility/2006" xmlns:a14="http://schemas.microsoft.com/office/drawing/2010/main">
-        <mc:Choice Requires="a14">
+      <mc:AlternateContent xmlns:mc="http://schemas.openxmlformats.org/markup-compatibility/2006">
+        <mc:Choice xmlns:a14="http://schemas.microsoft.com/office/drawing/2010/main" Requires="a14">
           <p:sp>
             <p:nvSpPr>
               <p:cNvPr id="6" name="Content Placeholder 5">
@@ -18594,27 +18504,6 @@
                       </a:rPr>
                       <m:t>i</m:t>
                     </m:r>
-                    <m:r>
-                      <a:rPr lang="en-US" b="0" i="0" smtClean="0">
-                        <a:latin typeface="Cambria Math" panose="02040503050406030204" pitchFamily="18" charset="0"/>
-                      </a:rPr>
-                      <m:t>≥</m:t>
-                    </m:r>
-                    <m:r>
-                      <m:rPr>
-                        <m:sty m:val="p"/>
-                      </m:rPr>
-                      <a:rPr lang="en-US" b="0" i="0" smtClean="0">
-                        <a:latin typeface="Cambria Math" panose="02040503050406030204" pitchFamily="18" charset="0"/>
-                      </a:rPr>
-                      <m:t>m</m:t>
-                    </m:r>
-                    <m:r>
-                      <a:rPr lang="en-US" b="0" i="0" smtClean="0">
-                        <a:latin typeface="Cambria Math" panose="02040503050406030204" pitchFamily="18" charset="0"/>
-                      </a:rPr>
-                      <m:t>−1</m:t>
-                    </m:r>
                   </m:oMath>
                 </a14:m>
                 <a:r>
@@ -18702,7 +18591,7 @@
             </p:txBody>
           </p:sp>
         </mc:Choice>
-        <mc:Fallback xmlns="">
+        <mc:Fallback>
           <p:sp>
             <p:nvSpPr>
               <p:cNvPr id="6" name="Content Placeholder 5">
@@ -18892,8 +18781,8 @@
           </a:p>
         </p:txBody>
       </p:sp>
-      <mc:AlternateContent xmlns:mc="http://schemas.openxmlformats.org/markup-compatibility/2006" xmlns:a14="http://schemas.microsoft.com/office/drawing/2010/main">
-        <mc:Choice Requires="a14">
+      <mc:AlternateContent xmlns:mc="http://schemas.openxmlformats.org/markup-compatibility/2006">
+        <mc:Choice xmlns:a14="http://schemas.microsoft.com/office/drawing/2010/main" Requires="a14">
           <p:sp>
             <p:nvSpPr>
               <p:cNvPr id="6" name="Content Placeholder 5">
@@ -19019,7 +18908,7 @@
                       <m:t>𝑠𝑖𝑛</m:t>
                     </m:r>
                     <m:r>
-                      <a:rPr lang="en-US" b="0" i="1" smtClean="0">
+                      <a:rPr lang="pt-BR" b="0" i="1" smtClean="0">
                         <a:latin typeface="Cambria Math" panose="02040503050406030204" pitchFamily="18" charset="0"/>
                       </a:rPr>
                       <m:t>⁡(</m:t>
@@ -19032,11 +18921,32 @@
                       <m:t>𝜃</m:t>
                     </m:r>
                     <m:r>
-                      <a:rPr lang="en-US" b="0" i="1" smtClean="0">
+                      <a:rPr lang="pt-BR" b="0" i="1" smtClean="0">
                         <a:latin typeface="Cambria Math" panose="02040503050406030204" pitchFamily="18" charset="0"/>
                         <a:ea typeface="Cambria Math" panose="02040503050406030204" pitchFamily="18" charset="0"/>
                       </a:rPr>
-                      <m:t>))∗</m:t>
+                      <m:t>)</m:t>
+                    </m:r>
+                    <m:r>
+                      <a:rPr lang="pt-BR" b="0" i="1" smtClean="0">
+                        <a:latin typeface="Cambria Math" panose="02040503050406030204" pitchFamily="18" charset="0"/>
+                        <a:ea typeface="Cambria Math" panose="02040503050406030204" pitchFamily="18" charset="0"/>
+                      </a:rPr>
+                      <m:t>∗</m:t>
+                    </m:r>
+                    <m:r>
+                      <a:rPr lang="pt-BR" b="0" i="1" smtClean="0">
+                        <a:latin typeface="Cambria Math" panose="02040503050406030204" pitchFamily="18" charset="0"/>
+                        <a:ea typeface="Cambria Math" panose="02040503050406030204" pitchFamily="18" charset="0"/>
+                      </a:rPr>
+                      <m:t>𝑖</m:t>
+                    </m:r>
+                    <m:r>
+                      <a:rPr lang="pt-BR" b="0" i="1" smtClean="0">
+                        <a:latin typeface="Cambria Math" panose="02040503050406030204" pitchFamily="18" charset="0"/>
+                        <a:ea typeface="Cambria Math" panose="02040503050406030204" pitchFamily="18" charset="0"/>
+                      </a:rPr>
+                      <m:t>)∗</m:t>
                     </m:r>
                     <m:func>
                       <m:funcPr>
@@ -19112,8 +19022,30 @@
                         <a:latin typeface="Cambria Math" panose="02040503050406030204" pitchFamily="18" charset="0"/>
                         <a:ea typeface="Cambria Math" panose="02040503050406030204" pitchFamily="18" charset="0"/>
                       </a:rPr>
-                      <m:t>))=</m:t>
+                      <m:t>)∗</m:t>
                     </m:r>
+                    <m:r>
+                      <a:rPr lang="pt-BR" b="0" i="1" smtClean="0">
+                        <a:latin typeface="Cambria Math" panose="02040503050406030204" pitchFamily="18" charset="0"/>
+                        <a:ea typeface="Cambria Math" panose="02040503050406030204" pitchFamily="18" charset="0"/>
+                      </a:rPr>
+                      <m:t>𝑖</m:t>
+                    </m:r>
+                    <m:r>
+                      <a:rPr lang="en-US" i="1">
+                        <a:latin typeface="Cambria Math" panose="02040503050406030204" pitchFamily="18" charset="0"/>
+                        <a:ea typeface="Cambria Math" panose="02040503050406030204" pitchFamily="18" charset="0"/>
+                      </a:rPr>
+                      <m:t>)</m:t>
+                    </m:r>
+                  </m:oMath>
+                </a14:m>
+                <a:endParaRPr lang="en-US" dirty="0"/>
+              </a:p>
+              <a:p>
+                <a:pPr lvl="1"/>
+                <a14:m>
+                  <m:oMath xmlns:m="http://schemas.openxmlformats.org/officeDocument/2006/math">
                     <m:func>
                       <m:funcPr>
                         <m:ctrlPr>
@@ -19126,14 +19058,14 @@
                         <m:sSup>
                           <m:sSupPr>
                             <m:ctrlPr>
-                              <a:rPr lang="en-US" i="1" smtClean="0">
+                              <a:rPr lang="en-US" i="1">
                                 <a:latin typeface="Cambria Math" panose="02040503050406030204" pitchFamily="18" charset="0"/>
                               </a:rPr>
                             </m:ctrlPr>
                           </m:sSupPr>
                           <m:e>
                             <m:r>
-                              <a:rPr lang="en-US" b="0" i="1" smtClean="0">
+                              <a:rPr lang="en-US" i="1">
                                 <a:latin typeface="Cambria Math" panose="02040503050406030204" pitchFamily="18" charset="0"/>
                               </a:rPr>
                               <m:t>𝑐𝑜𝑠</m:t>
@@ -19141,7 +19073,157 @@
                           </m:e>
                           <m:sup>
                             <m:r>
-                              <a:rPr lang="en-US" b="0" i="1" smtClean="0">
+                              <a:rPr lang="en-US" i="1">
+                                <a:latin typeface="Cambria Math" panose="02040503050406030204" pitchFamily="18" charset="0"/>
+                              </a:rPr>
+                              <m:t>2</m:t>
+                            </m:r>
+                          </m:sup>
+                        </m:sSup>
+                      </m:fName>
+                      <m:e>
+                        <m:d>
+                          <m:dPr>
+                            <m:ctrlPr>
+                              <a:rPr lang="en-US" i="1">
+                                <a:latin typeface="Cambria Math" panose="02040503050406030204" pitchFamily="18" charset="0"/>
+                              </a:rPr>
+                            </m:ctrlPr>
+                          </m:dPr>
+                          <m:e>
+                            <m:r>
+                              <a:rPr lang="en-US" i="1">
+                                <a:latin typeface="Cambria Math" panose="02040503050406030204" pitchFamily="18" charset="0"/>
+                                <a:ea typeface="Cambria Math" panose="02040503050406030204" pitchFamily="18" charset="0"/>
+                              </a:rPr>
+                              <m:t>𝜃</m:t>
+                            </m:r>
+                          </m:e>
+                        </m:d>
+                      </m:e>
+                    </m:func>
+                    <m:r>
+                      <a:rPr lang="pt-BR" b="0" i="1" smtClean="0">
+                        <a:latin typeface="Cambria Math" panose="02040503050406030204" pitchFamily="18" charset="0"/>
+                        <a:ea typeface="Cambria Math" panose="02040503050406030204" pitchFamily="18" charset="0"/>
+                      </a:rPr>
+                      <m:t>−</m:t>
+                    </m:r>
+                    <m:sSup>
+                      <m:sSupPr>
+                        <m:ctrlPr>
+                          <a:rPr lang="en-US" i="1">
+                            <a:latin typeface="Cambria Math" panose="02040503050406030204" pitchFamily="18" charset="0"/>
+                          </a:rPr>
+                        </m:ctrlPr>
+                      </m:sSupPr>
+                      <m:e>
+                        <m:r>
+                          <a:rPr lang="en-US" i="1">
+                            <a:latin typeface="Cambria Math" panose="02040503050406030204" pitchFamily="18" charset="0"/>
+                          </a:rPr>
+                          <m:t>𝑠𝑖𝑛</m:t>
+                        </m:r>
+                      </m:e>
+                      <m:sup>
+                        <m:r>
+                          <a:rPr lang="en-US" i="1">
+                            <a:latin typeface="Cambria Math" panose="02040503050406030204" pitchFamily="18" charset="0"/>
+                          </a:rPr>
+                          <m:t>2</m:t>
+                        </m:r>
+                      </m:sup>
+                    </m:sSup>
+                    <m:d>
+                      <m:dPr>
+                        <m:ctrlPr>
+                          <a:rPr lang="en-US" i="1">
+                            <a:latin typeface="Cambria Math" panose="02040503050406030204" pitchFamily="18" charset="0"/>
+                          </a:rPr>
+                        </m:ctrlPr>
+                      </m:dPr>
+                      <m:e>
+                        <m:r>
+                          <a:rPr lang="en-US" i="1">
+                            <a:latin typeface="Cambria Math" panose="02040503050406030204" pitchFamily="18" charset="0"/>
+                          </a:rPr>
+                          <m:t>𝜃</m:t>
+                        </m:r>
+                      </m:e>
+                    </m:d>
+                    <m:r>
+                      <a:rPr lang="pt-BR" b="0" i="1" smtClean="0">
+                        <a:latin typeface="Cambria Math" panose="02040503050406030204" pitchFamily="18" charset="0"/>
+                      </a:rPr>
+                      <m:t>∗</m:t>
+                    </m:r>
+                    <m:sSup>
+                      <m:sSupPr>
+                        <m:ctrlPr>
+                          <a:rPr lang="pt-BR" b="0" i="1" smtClean="0">
+                            <a:latin typeface="Cambria Math" panose="02040503050406030204" pitchFamily="18" charset="0"/>
+                          </a:rPr>
+                        </m:ctrlPr>
+                      </m:sSupPr>
+                      <m:e>
+                        <m:r>
+                          <a:rPr lang="pt-BR" b="0" i="1" smtClean="0">
+                            <a:latin typeface="Cambria Math" panose="02040503050406030204" pitchFamily="18" charset="0"/>
+                          </a:rPr>
+                          <m:t>𝑖</m:t>
+                        </m:r>
+                      </m:e>
+                      <m:sup>
+                        <m:r>
+                          <a:rPr lang="pt-BR" b="0" i="1" smtClean="0">
+                            <a:latin typeface="Cambria Math" panose="02040503050406030204" pitchFamily="18" charset="0"/>
+                          </a:rPr>
+                          <m:t>2</m:t>
+                        </m:r>
+                      </m:sup>
+                    </m:sSup>
+                    <m:r>
+                      <a:rPr lang="en-US" i="1">
+                        <a:latin typeface="Cambria Math" panose="02040503050406030204" pitchFamily="18" charset="0"/>
+                      </a:rPr>
+                      <m:t>=</m:t>
+                    </m:r>
+                  </m:oMath>
+                </a14:m>
+                <a:r>
+                  <a:rPr lang="en-US" dirty="0"/>
+                  <a:t> </a:t>
+                </a:r>
+                <a14:m>
+                  <m:oMath xmlns:m="http://schemas.openxmlformats.org/officeDocument/2006/math">
+                    <m:func>
+                      <m:funcPr>
+                        <m:ctrlPr>
+                          <a:rPr lang="en-US" i="1">
+                            <a:latin typeface="Cambria Math" panose="02040503050406030204" pitchFamily="18" charset="0"/>
+                          </a:rPr>
+                        </m:ctrlPr>
+                      </m:funcPr>
+                      <m:fName>
+                        <m:sSup>
+                          <m:sSupPr>
+                            <m:ctrlPr>
+                              <a:rPr lang="en-US" i="1">
+                                <a:latin typeface="Cambria Math" panose="02040503050406030204" pitchFamily="18" charset="0"/>
+                              </a:rPr>
+                            </m:ctrlPr>
+                          </m:sSupPr>
+                          <m:e>
+                            <m:r>
+                              <a:rPr lang="en-US" i="1">
+                                <a:latin typeface="Cambria Math" panose="02040503050406030204" pitchFamily="18" charset="0"/>
+                              </a:rPr>
+                              <m:t>𝑐𝑜𝑠</m:t>
+                            </m:r>
+                          </m:e>
+                          <m:sup>
+                            <m:r>
+                              <a:rPr lang="en-US" i="1">
                                 <a:latin typeface="Cambria Math" panose="02040503050406030204" pitchFamily="18" charset="0"/>
                               </a:rPr>
                               <m:t>2</m:t>
@@ -19179,14 +19261,14 @@
                     <m:sSup>
                       <m:sSupPr>
                         <m:ctrlPr>
-                          <a:rPr lang="en-US" i="1" smtClean="0">
+                          <a:rPr lang="en-US" i="1">
                             <a:latin typeface="Cambria Math" panose="02040503050406030204" pitchFamily="18" charset="0"/>
                           </a:rPr>
                         </m:ctrlPr>
                       </m:sSupPr>
                       <m:e>
                         <m:r>
-                          <a:rPr lang="en-US" b="0" i="1" smtClean="0">
+                          <a:rPr lang="en-US" i="1">
                             <a:latin typeface="Cambria Math" panose="02040503050406030204" pitchFamily="18" charset="0"/>
                           </a:rPr>
                           <m:t>𝑠𝑖𝑛</m:t>
@@ -19194,7 +19276,7 @@
                       </m:e>
                       <m:sup>
                         <m:r>
-                          <a:rPr lang="en-US" b="0" i="1" smtClean="0">
+                          <a:rPr lang="en-US" i="1">
                             <a:latin typeface="Cambria Math" panose="02040503050406030204" pitchFamily="18" charset="0"/>
                           </a:rPr>
                           <m:t>2</m:t>
@@ -19202,7 +19284,7 @@
                       </m:sup>
                     </m:sSup>
                     <m:r>
-                      <a:rPr lang="en-US" b="0" i="1" smtClean="0">
+                      <a:rPr lang="en-US" i="1">
                         <a:latin typeface="Cambria Math" panose="02040503050406030204" pitchFamily="18" charset="0"/>
                       </a:rPr>
                       <m:t>(</m:t>
@@ -19214,7 +19296,7 @@
                       <m:t>𝜃</m:t>
                     </m:r>
                     <m:r>
-                      <a:rPr lang="en-US" b="0" i="1" smtClean="0">
+                      <a:rPr lang="en-US" i="1">
                         <a:latin typeface="Cambria Math" panose="02040503050406030204" pitchFamily="18" charset="0"/>
                       </a:rPr>
                       <m:t>)=1</m:t>
@@ -19304,31 +19386,56 @@
                       </a:rPr>
                       <m:t>+</m:t>
                     </m:r>
+                    <m:func>
+                      <m:funcPr>
+                        <m:ctrlPr>
+                          <a:rPr lang="pt-BR" b="0" i="1" smtClean="0">
+                            <a:latin typeface="Cambria Math" panose="02040503050406030204" pitchFamily="18" charset="0"/>
+                          </a:rPr>
+                        </m:ctrlPr>
+                      </m:funcPr>
+                      <m:fName>
+                        <m:r>
+                          <a:rPr lang="en-US" i="1">
+                            <a:latin typeface="Cambria Math" panose="02040503050406030204" pitchFamily="18" charset="0"/>
+                          </a:rPr>
+                          <m:t>𝑠𝑖𝑛</m:t>
+                        </m:r>
+                      </m:fName>
+                      <m:e>
+                        <m:d>
+                          <m:dPr>
+                            <m:ctrlPr>
+                              <a:rPr lang="pt-BR" b="0" i="1" smtClean="0">
+                                <a:latin typeface="Cambria Math" panose="02040503050406030204" pitchFamily="18" charset="0"/>
+                              </a:rPr>
+                            </m:ctrlPr>
+                          </m:dPr>
+                          <m:e>
+                            <m:r>
+                              <a:rPr lang="en-US" i="1">
+                                <a:latin typeface="Cambria Math" panose="02040503050406030204" pitchFamily="18" charset="0"/>
+                                <a:ea typeface="Cambria Math" panose="02040503050406030204" pitchFamily="18" charset="0"/>
+                              </a:rPr>
+                              <m:t>𝜃</m:t>
+                            </m:r>
+                          </m:e>
+                        </m:d>
+                      </m:e>
+                    </m:func>
                     <m:r>
-                      <a:rPr lang="en-US" i="1">
-                        <a:latin typeface="Cambria Math" panose="02040503050406030204" pitchFamily="18" charset="0"/>
-                      </a:rPr>
-                      <m:t>𝑠𝑖𝑛</m:t>
-                    </m:r>
-                    <m:r>
-                      <a:rPr lang="en-US" i="1">
-                        <a:latin typeface="Cambria Math" panose="02040503050406030204" pitchFamily="18" charset="0"/>
-                      </a:rPr>
-                      <m:t>⁡(</m:t>
-                    </m:r>
-                    <m:r>
-                      <a:rPr lang="en-US" i="1">
+                      <a:rPr lang="pt-BR" b="0" i="1" smtClean="0">
                         <a:latin typeface="Cambria Math" panose="02040503050406030204" pitchFamily="18" charset="0"/>
                         <a:ea typeface="Cambria Math" panose="02040503050406030204" pitchFamily="18" charset="0"/>
                       </a:rPr>
-                      <m:t>𝜃</m:t>
+                      <m:t>∗</m:t>
                     </m:r>
                     <m:r>
-                      <a:rPr lang="en-US" i="1">
+                      <a:rPr lang="pt-BR" b="0" i="1" smtClean="0">
                         <a:latin typeface="Cambria Math" panose="02040503050406030204" pitchFamily="18" charset="0"/>
                         <a:ea typeface="Cambria Math" panose="02040503050406030204" pitchFamily="18" charset="0"/>
                       </a:rPr>
-                      <m:t>)</m:t>
+                      <m:t>𝑖</m:t>
                     </m:r>
                   </m:oMath>
                 </a14:m>
@@ -19413,38 +19520,63 @@
                       </a:rPr>
                       <m:t>−</m:t>
                     </m:r>
+                    <m:func>
+                      <m:funcPr>
+                        <m:ctrlPr>
+                          <a:rPr lang="pt-BR" b="0" i="1" smtClean="0">
+                            <a:latin typeface="Cambria Math" panose="02040503050406030204" pitchFamily="18" charset="0"/>
+                            <a:ea typeface="Cambria Math" panose="02040503050406030204" pitchFamily="18" charset="0"/>
+                          </a:rPr>
+                        </m:ctrlPr>
+                      </m:funcPr>
+                      <m:fName>
+                        <m:r>
+                          <a:rPr lang="pt-BR" b="0" i="1" smtClean="0">
+                            <a:latin typeface="Cambria Math" panose="02040503050406030204" pitchFamily="18" charset="0"/>
+                            <a:ea typeface="Cambria Math" panose="02040503050406030204" pitchFamily="18" charset="0"/>
+                          </a:rPr>
+                          <m:t>𝑠𝑖𝑛</m:t>
+                        </m:r>
+                      </m:fName>
+                      <m:e>
+                        <m:d>
+                          <m:dPr>
+                            <m:ctrlPr>
+                              <a:rPr lang="pt-BR" b="0" i="1" smtClean="0">
+                                <a:latin typeface="Cambria Math" panose="02040503050406030204" pitchFamily="18" charset="0"/>
+                                <a:ea typeface="Cambria Math" panose="02040503050406030204" pitchFamily="18" charset="0"/>
+                              </a:rPr>
+                            </m:ctrlPr>
+                          </m:dPr>
+                          <m:e>
+                            <m:r>
+                              <a:rPr lang="en-US" i="1">
+                                <a:latin typeface="Cambria Math" panose="02040503050406030204" pitchFamily="18" charset="0"/>
+                                <a:ea typeface="Cambria Math" panose="02040503050406030204" pitchFamily="18" charset="0"/>
+                              </a:rPr>
+                              <m:t>𝜃</m:t>
+                            </m:r>
+                          </m:e>
+                        </m:d>
+                      </m:e>
+                    </m:func>
                     <m:r>
-                      <a:rPr lang="en-US" i="1">
-                        <a:latin typeface="Cambria Math" panose="02040503050406030204" pitchFamily="18" charset="0"/>
-                      </a:rPr>
-                      <m:t>𝑠𝑖𝑛</m:t>
-                    </m:r>
-                    <m:r>
-                      <a:rPr lang="en-US" i="1">
-                        <a:latin typeface="Cambria Math" panose="02040503050406030204" pitchFamily="18" charset="0"/>
-                      </a:rPr>
-                      <m:t>⁡(</m:t>
-                    </m:r>
-                    <m:r>
-                      <a:rPr lang="en-US" i="1">
+                      <a:rPr lang="pt-BR" b="0" i="1" smtClean="0">
                         <a:latin typeface="Cambria Math" panose="02040503050406030204" pitchFamily="18" charset="0"/>
                         <a:ea typeface="Cambria Math" panose="02040503050406030204" pitchFamily="18" charset="0"/>
                       </a:rPr>
-                      <m:t>𝜃</m:t>
+                      <m:t>∗</m:t>
                     </m:r>
                     <m:r>
-                      <a:rPr lang="en-US" i="1">
+                      <a:rPr lang="pt-BR" b="0" i="1" smtClean="0">
                         <a:latin typeface="Cambria Math" panose="02040503050406030204" pitchFamily="18" charset="0"/>
                         <a:ea typeface="Cambria Math" panose="02040503050406030204" pitchFamily="18" charset="0"/>
                       </a:rPr>
-                      <m:t>)</m:t>
+                      <m:t>𝑖</m:t>
                     </m:r>
                   </m:oMath>
                 </a14:m>
-                <a:r>
-                  <a:rPr lang="en-US" dirty="0"/>
-                  <a:t> </a:t>
-                </a:r>
+                <a:endParaRPr lang="en-US" dirty="0"/>
               </a:p>
               <a:p>
                 <a:r>
@@ -19719,7 +19851,7 @@
             </p:txBody>
           </p:sp>
         </mc:Choice>
-        <mc:Fallback xmlns="">
+        <mc:Fallback>
           <p:sp>
             <p:nvSpPr>
               <p:cNvPr id="6" name="Content Placeholder 5">
@@ -20616,6 +20748,28 @@
             <a:r>
               <a:rPr lang="en-US" dirty="0"/>
               <a:t>String Matching with wildcards</a:t>
+            </a:r>
+          </a:p>
+          <a:p>
+            <a:pPr marL="457200" indent="-457200">
+              <a:buFont typeface="+mj-lt"/>
+              <a:buAutoNum type="arabicPeriod"/>
+            </a:pPr>
+            <a:r>
+              <a:rPr lang="en-US" dirty="0" err="1"/>
+              <a:t>AtCoder</a:t>
+            </a:r>
+            <a:r>
+              <a:rPr lang="en-US" dirty="0"/>
+              <a:t> ABC 196 – F – </a:t>
+            </a:r>
+            <a:r>
+              <a:rPr lang="en-US" dirty="0" err="1"/>
+              <a:t>Subtring</a:t>
+            </a:r>
+            <a:r>
+              <a:rPr lang="en-US" dirty="0"/>
+              <a:t> 2</a:t>
             </a:r>
           </a:p>
         </p:txBody>
@@ -21879,10 +22033,10 @@
                       </m:e>
                       <m:sub>
                         <m:r>
-                          <a:rPr lang="en-US" i="1">
-                            <a:latin typeface="Cambria Math" panose="02040503050406030204" pitchFamily="18" charset="0"/>
-                          </a:rPr>
-                          <m:t>𝑖</m:t>
+                          <a:rPr lang="pt-BR" b="0" i="1" smtClean="0">
+                            <a:latin typeface="Cambria Math" panose="02040503050406030204" pitchFamily="18" charset="0"/>
+                          </a:rPr>
+                          <m:t>2</m:t>
                         </m:r>
                       </m:sub>
                     </m:sSub>
@@ -23094,8 +23248,8 @@
           </p:sp>
         </mc:Fallback>
       </mc:AlternateContent>
-      <mc:AlternateContent xmlns:mc="http://schemas.openxmlformats.org/markup-compatibility/2006">
-        <mc:Choice xmlns:a14="http://schemas.microsoft.com/office/drawing/2010/main" Requires="a14">
+      <mc:AlternateContent xmlns:mc="http://schemas.openxmlformats.org/markup-compatibility/2006" xmlns:a14="http://schemas.microsoft.com/office/drawing/2010/main">
+        <mc:Choice Requires="a14">
           <p:sp>
             <p:nvSpPr>
               <p:cNvPr id="4" name="Content Placeholder 2">
@@ -23936,7 +24090,7 @@
             </p:txBody>
           </p:sp>
         </mc:Choice>
-        <mc:Fallback>
+        <mc:Fallback xmlns="">
           <p:sp>
             <p:nvSpPr>
               <p:cNvPr id="4" name="Content Placeholder 2">
@@ -24056,8 +24210,8 @@
           </a:p>
         </p:txBody>
       </p:sp>
-      <mc:AlternateContent xmlns:mc="http://schemas.openxmlformats.org/markup-compatibility/2006">
-        <mc:Choice xmlns:a14="http://schemas.microsoft.com/office/drawing/2010/main" Requires="a14">
+      <mc:AlternateContent xmlns:mc="http://schemas.openxmlformats.org/markup-compatibility/2006" xmlns:a14="http://schemas.microsoft.com/office/drawing/2010/main">
+        <mc:Choice Requires="a14">
           <p:sp>
             <p:nvSpPr>
               <p:cNvPr id="3" name="Content Placeholder 2">
@@ -25229,7 +25383,7 @@
             </p:txBody>
           </p:sp>
         </mc:Choice>
-        <mc:Fallback>
+        <mc:Fallback xmlns="">
           <p:sp>
             <p:nvSpPr>
               <p:cNvPr id="3" name="Content Placeholder 2">
@@ -25273,8 +25427,8 @@
           </p:sp>
         </mc:Fallback>
       </mc:AlternateContent>
-      <mc:AlternateContent xmlns:mc="http://schemas.openxmlformats.org/markup-compatibility/2006">
-        <mc:Choice xmlns:a14="http://schemas.microsoft.com/office/drawing/2010/main" Requires="a14">
+      <mc:AlternateContent xmlns:mc="http://schemas.openxmlformats.org/markup-compatibility/2006" xmlns:a14="http://schemas.microsoft.com/office/drawing/2010/main">
+        <mc:Choice Requires="a14">
           <p:sp>
             <p:nvSpPr>
               <p:cNvPr id="4" name="Content Placeholder 2">
@@ -26317,7 +26471,7 @@
             </p:txBody>
           </p:sp>
         </mc:Choice>
-        <mc:Fallback>
+        <mc:Fallback xmlns="">
           <p:sp>
             <p:nvSpPr>
               <p:cNvPr id="4" name="Content Placeholder 2">

</xml_diff>